<commit_message>
final changes for lec 3
</commit_message>
<xml_diff>
--- a/Lec3/Lecture_3.pptx
+++ b/Lec3/Lecture_3.pptx
@@ -5,15 +5,26 @@
     <p:sldMasterId id="2147483648" r:id="rId1"/>
   </p:sldMasterIdLst>
   <p:notesMasterIdLst>
-    <p:notesMasterId r:id="rId8"/>
+    <p:notesMasterId r:id="rId19"/>
   </p:notesMasterIdLst>
   <p:sldIdLst>
     <p:sldId id="256" r:id="rId2"/>
-    <p:sldId id="258" r:id="rId3"/>
-    <p:sldId id="259" r:id="rId4"/>
-    <p:sldId id="260" r:id="rId5"/>
-    <p:sldId id="261" r:id="rId6"/>
-    <p:sldId id="262" r:id="rId7"/>
+    <p:sldId id="264" r:id="rId3"/>
+    <p:sldId id="258" r:id="rId4"/>
+    <p:sldId id="263" r:id="rId5"/>
+    <p:sldId id="267" r:id="rId6"/>
+    <p:sldId id="266" r:id="rId7"/>
+    <p:sldId id="268" r:id="rId8"/>
+    <p:sldId id="272" r:id="rId9"/>
+    <p:sldId id="269" r:id="rId10"/>
+    <p:sldId id="270" r:id="rId11"/>
+    <p:sldId id="271" r:id="rId12"/>
+    <p:sldId id="273" r:id="rId13"/>
+    <p:sldId id="275" r:id="rId14"/>
+    <p:sldId id="276" r:id="rId15"/>
+    <p:sldId id="277" r:id="rId16"/>
+    <p:sldId id="278" r:id="rId17"/>
+    <p:sldId id="279" r:id="rId18"/>
   </p:sldIdLst>
   <p:sldSz cx="9144000" cy="6858000" type="screen4x3"/>
   <p:notesSz cx="6858000" cy="9144000"/>
@@ -213,7 +224,7 @@
           <a:p>
             <a:fld id="{C4C6B73B-45EA-47FD-A56C-CA3C9E6BCAA5}" type="datetimeFigureOut">
               <a:rPr lang="en-US" smtClean="0"/>
-              <a:t>9/26/2014</a:t>
+              <a:t>1/22/2015</a:t>
             </a:fld>
             <a:endParaRPr lang="en-US"/>
           </a:p>
@@ -527,15 +538,11 @@
           <a:p>
             <a:r>
               <a:rPr lang="en-US" dirty="0" smtClean="0"/>
-              <a:t>Story about </a:t>
-            </a:r>
-            <a:r>
-              <a:rPr lang="en-US" dirty="0" err="1" smtClean="0"/>
-              <a:t>Orkin</a:t>
+              <a:t>Version control of “what” you might ask? Versions of anything electronic.  People keep track of recopies</a:t>
             </a:r>
             <a:r>
               <a:rPr lang="en-US" baseline="0" dirty="0" smtClean="0"/>
-              <a:t> plots </a:t>
+              <a:t> with Git (See taco fancy)</a:t>
             </a:r>
             <a:endParaRPr lang="en-US" dirty="0"/>
           </a:p>
@@ -558,7 +565,7 @@
           <a:p>
             <a:fld id="{CAA25B9C-3AE8-4E63-943D-8CD36A796F96}" type="slidenum">
               <a:rPr lang="en-US" smtClean="0"/>
-              <a:t>2</a:t>
+              <a:t>3</a:t>
             </a:fld>
             <a:endParaRPr lang="en-US"/>
           </a:p>
@@ -766,7 +773,7 @@
           <a:p>
             <a:fld id="{FB4D832D-09DF-4D16-B21B-C4F14FB0DF50}" type="datetimeFigureOut">
               <a:rPr lang="en-US" smtClean="0"/>
-              <a:t>9/26/2014</a:t>
+              <a:t>1/22/2015</a:t>
             </a:fld>
             <a:endParaRPr lang="en-US"/>
           </a:p>
@@ -984,7 +991,7 @@
           <a:p>
             <a:fld id="{FB4D832D-09DF-4D16-B21B-C4F14FB0DF50}" type="datetimeFigureOut">
               <a:rPr lang="en-US" smtClean="0"/>
-              <a:t>9/26/2014</a:t>
+              <a:t>1/22/2015</a:t>
             </a:fld>
             <a:endParaRPr lang="en-US"/>
           </a:p>
@@ -1171,7 +1178,7 @@
           <a:p>
             <a:fld id="{FB4D832D-09DF-4D16-B21B-C4F14FB0DF50}" type="datetimeFigureOut">
               <a:rPr lang="en-US" smtClean="0"/>
-              <a:t>9/26/2014</a:t>
+              <a:t>1/22/2015</a:t>
             </a:fld>
             <a:endParaRPr lang="en-US"/>
           </a:p>
@@ -1358,7 +1365,7 @@
           <a:p>
             <a:fld id="{FB4D832D-09DF-4D16-B21B-C4F14FB0DF50}" type="datetimeFigureOut">
               <a:rPr lang="en-US" smtClean="0"/>
-              <a:t>9/26/2014</a:t>
+              <a:t>1/22/2015</a:t>
             </a:fld>
             <a:endParaRPr lang="en-US"/>
           </a:p>
@@ -1652,7 +1659,7 @@
           <a:p>
             <a:fld id="{FB4D832D-09DF-4D16-B21B-C4F14FB0DF50}" type="datetimeFigureOut">
               <a:rPr lang="en-US" smtClean="0"/>
-              <a:t>9/26/2014</a:t>
+              <a:t>1/22/2015</a:t>
             </a:fld>
             <a:endParaRPr lang="en-US"/>
           </a:p>
@@ -1947,7 +1954,7 @@
           <a:p>
             <a:fld id="{FB4D832D-09DF-4D16-B21B-C4F14FB0DF50}" type="datetimeFigureOut">
               <a:rPr lang="en-US" smtClean="0"/>
-              <a:t>9/26/2014</a:t>
+              <a:t>1/22/2015</a:t>
             </a:fld>
             <a:endParaRPr lang="en-US"/>
           </a:p>
@@ -2376,7 +2383,7 @@
           <a:p>
             <a:fld id="{FB4D832D-09DF-4D16-B21B-C4F14FB0DF50}" type="datetimeFigureOut">
               <a:rPr lang="en-US" smtClean="0"/>
-              <a:t>9/26/2014</a:t>
+              <a:t>1/22/2015</a:t>
             </a:fld>
             <a:endParaRPr lang="en-US"/>
           </a:p>
@@ -2494,7 +2501,7 @@
           <a:p>
             <a:fld id="{FB4D832D-09DF-4D16-B21B-C4F14FB0DF50}" type="datetimeFigureOut">
               <a:rPr lang="en-US" smtClean="0"/>
-              <a:t>9/26/2014</a:t>
+              <a:t>1/22/2015</a:t>
             </a:fld>
             <a:endParaRPr lang="en-US"/>
           </a:p>
@@ -2596,7 +2603,7 @@
           <a:p>
             <a:fld id="{FB4D832D-09DF-4D16-B21B-C4F14FB0DF50}" type="datetimeFigureOut">
               <a:rPr lang="en-US" smtClean="0"/>
-              <a:t>9/26/2014</a:t>
+              <a:t>1/22/2015</a:t>
             </a:fld>
             <a:endParaRPr lang="en-US"/>
           </a:p>
@@ -2873,7 +2880,7 @@
           <a:p>
             <a:fld id="{FB4D832D-09DF-4D16-B21B-C4F14FB0DF50}" type="datetimeFigureOut">
               <a:rPr lang="en-US" smtClean="0"/>
-              <a:t>9/26/2014</a:t>
+              <a:t>1/22/2015</a:t>
             </a:fld>
             <a:endParaRPr lang="en-US"/>
           </a:p>
@@ -3137,7 +3144,7 @@
           <a:p>
             <a:fld id="{FB4D832D-09DF-4D16-B21B-C4F14FB0DF50}" type="datetimeFigureOut">
               <a:rPr lang="en-US" smtClean="0"/>
-              <a:t>9/26/2014</a:t>
+              <a:t>1/22/2015</a:t>
             </a:fld>
             <a:endParaRPr lang="en-US"/>
           </a:p>
@@ -3357,7 +3364,7 @@
           <a:p>
             <a:fld id="{FB4D832D-09DF-4D16-B21B-C4F14FB0DF50}" type="datetimeFigureOut">
               <a:rPr lang="en-US" smtClean="0"/>
-              <a:t>9/26/2014</a:t>
+              <a:t>1/22/2015</a:t>
             </a:fld>
             <a:endParaRPr lang="en-US"/>
           </a:p>
@@ -3784,7 +3791,7 @@
             </a:br>
             <a:r>
               <a:rPr lang="en-US" sz="2200" dirty="0" smtClean="0"/>
-              <a:t>September 25, </a:t>
+              <a:t>January 22, </a:t>
             </a:r>
             <a:r>
               <a:rPr lang="en-US" sz="2200" dirty="0"/>
@@ -3805,43 +3812,566 @@
         </p:nvSpPr>
         <p:spPr>
           <a:xfrm>
-            <a:off x="1295400" y="3276600"/>
-            <a:ext cx="6172200" cy="2209800"/>
+            <a:off x="304800" y="3124200"/>
+            <a:ext cx="3124200" cy="2514600"/>
           </a:xfrm>
         </p:spPr>
         <p:txBody>
           <a:bodyPr>
-            <a:normAutofit fontScale="62500" lnSpcReduction="20000"/>
+            <a:normAutofit fontScale="55000" lnSpcReduction="20000"/>
           </a:bodyPr>
           <a:lstStyle/>
           <a:p>
             <a:pPr algn="l"/>
             <a:r>
               <a:rPr lang="en-US" dirty="0" smtClean="0"/>
-              <a:t>Benefits of R &amp; data.table</a:t>
+              <a:t>Review</a:t>
+            </a:r>
+          </a:p>
+          <a:p>
+            <a:pPr marL="457200" indent="-457200" algn="l">
+              <a:buFont typeface="Arial" panose="020B0604020202020204" pitchFamily="34" charset="0"/>
+              <a:buChar char="•"/>
+            </a:pPr>
+            <a:r>
+              <a:rPr lang="en-US" dirty="0" smtClean="0"/>
+              <a:t>Homework</a:t>
+            </a:r>
+          </a:p>
+          <a:p>
+            <a:pPr marL="457200" indent="-457200" algn="l">
+              <a:buFont typeface="Arial" panose="020B0604020202020204" pitchFamily="34" charset="0"/>
+              <a:buChar char="•"/>
+            </a:pPr>
+            <a:r>
+              <a:rPr lang="en-US" dirty="0" smtClean="0"/>
+              <a:t>R Studio</a:t>
+            </a:r>
+          </a:p>
+          <a:p>
+            <a:pPr marL="457200" indent="-457200" algn="l">
+              <a:buFont typeface="Arial" panose="020B0604020202020204" pitchFamily="34" charset="0"/>
+              <a:buChar char="•"/>
+            </a:pPr>
+            <a:r>
+              <a:rPr lang="en-US" dirty="0" smtClean="0"/>
+              <a:t>Git</a:t>
             </a:r>
           </a:p>
           <a:p>
             <a:pPr algn="l"/>
             <a:r>
               <a:rPr lang="en-US" dirty="0" smtClean="0"/>
-              <a:t>Analysis and data manipulation</a:t>
-            </a:r>
-            <a:endParaRPr lang="en-US" dirty="0" smtClean="0"/>
-          </a:p>
+              <a:t>R Language</a:t>
+            </a:r>
+          </a:p>
+          <a:p>
+            <a:pPr marL="457200" indent="-457200" algn="l">
+              <a:buFont typeface="Arial" panose="020B0604020202020204" pitchFamily="34" charset="0"/>
+              <a:buChar char="•"/>
+            </a:pPr>
+            <a:r>
+              <a:rPr lang="en-US" dirty="0" smtClean="0"/>
+              <a:t>Packages vs projects</a:t>
+            </a:r>
+          </a:p>
+          <a:p>
+            <a:pPr marL="457200" indent="-457200" algn="l">
+              <a:buFont typeface="Arial" panose="020B0604020202020204" pitchFamily="34" charset="0"/>
+              <a:buChar char="•"/>
+            </a:pPr>
+            <a:r>
+              <a:rPr lang="en-US" dirty="0" smtClean="0"/>
+              <a:t>Documentation</a:t>
+            </a:r>
+          </a:p>
+          <a:p>
+            <a:pPr marL="457200" indent="-457200" algn="l">
+              <a:buFont typeface="Arial" panose="020B0604020202020204" pitchFamily="34" charset="0"/>
+              <a:buChar char="•"/>
+            </a:pPr>
+            <a:r>
+              <a:rPr lang="en-US" dirty="0" smtClean="0"/>
+              <a:t>Unit testing</a:t>
+            </a:r>
+          </a:p>
+          <a:p>
+            <a:pPr marL="457200" indent="-457200" algn="l">
+              <a:buFont typeface="Arial" panose="020B0604020202020204" pitchFamily="34" charset="0"/>
+              <a:buChar char="•"/>
+            </a:pPr>
+            <a:r>
+              <a:rPr lang="en-US" dirty="0" smtClean="0"/>
+              <a:t>Objects</a:t>
+            </a:r>
+            <a:endParaRPr lang="en-US" dirty="0"/>
+          </a:p>
+        </p:txBody>
+      </p:sp>
+      <p:sp>
+        <p:nvSpPr>
+          <p:cNvPr id="4" name="Subtitle 2"/>
+          <p:cNvSpPr txBox="1">
+            <a:spLocks/>
+          </p:cNvSpPr>
+          <p:nvPr/>
+        </p:nvSpPr>
+        <p:spPr>
+          <a:xfrm>
+            <a:off x="2971800" y="3124200"/>
+            <a:ext cx="3124200" cy="2514600"/>
+          </a:xfrm>
+          <a:prstGeom prst="rect">
+            <a:avLst/>
+          </a:prstGeom>
+        </p:spPr>
+        <p:txBody>
+          <a:bodyPr vert="horz" lIns="91440" tIns="45720" rIns="91440" bIns="45720" rtlCol="0">
+            <a:normAutofit fontScale="55000" lnSpcReduction="20000"/>
+          </a:bodyPr>
+          <a:lstStyle>
+            <a:lvl1pPr marL="0" indent="0" algn="ctr" defTabSz="914400" rtl="0" eaLnBrk="1" latinLnBrk="0" hangingPunct="1">
+              <a:spcBef>
+                <a:spcPct val="20000"/>
+              </a:spcBef>
+              <a:buFont typeface="Arial" pitchFamily="34" charset="0"/>
+              <a:buNone/>
+              <a:defRPr sz="3200" kern="1200">
+                <a:solidFill>
+                  <a:schemeClr val="tx1">
+                    <a:tint val="75000"/>
+                  </a:schemeClr>
+                </a:solidFill>
+                <a:latin typeface="+mn-lt"/>
+                <a:ea typeface="+mn-ea"/>
+                <a:cs typeface="+mn-cs"/>
+              </a:defRPr>
+            </a:lvl1pPr>
+            <a:lvl2pPr marL="457200" indent="0" algn="ctr" defTabSz="914400" rtl="0" eaLnBrk="1" latinLnBrk="0" hangingPunct="1">
+              <a:spcBef>
+                <a:spcPct val="20000"/>
+              </a:spcBef>
+              <a:buFont typeface="Arial" pitchFamily="34" charset="0"/>
+              <a:buNone/>
+              <a:defRPr sz="2800" kern="1200">
+                <a:solidFill>
+                  <a:schemeClr val="tx1">
+                    <a:tint val="75000"/>
+                  </a:schemeClr>
+                </a:solidFill>
+                <a:latin typeface="+mn-lt"/>
+                <a:ea typeface="+mn-ea"/>
+                <a:cs typeface="+mn-cs"/>
+              </a:defRPr>
+            </a:lvl2pPr>
+            <a:lvl3pPr marL="914400" indent="0" algn="ctr" defTabSz="914400" rtl="0" eaLnBrk="1" latinLnBrk="0" hangingPunct="1">
+              <a:spcBef>
+                <a:spcPct val="20000"/>
+              </a:spcBef>
+              <a:buFont typeface="Arial" pitchFamily="34" charset="0"/>
+              <a:buNone/>
+              <a:defRPr sz="2400" kern="1200">
+                <a:solidFill>
+                  <a:schemeClr val="tx1">
+                    <a:tint val="75000"/>
+                  </a:schemeClr>
+                </a:solidFill>
+                <a:latin typeface="+mn-lt"/>
+                <a:ea typeface="+mn-ea"/>
+                <a:cs typeface="+mn-cs"/>
+              </a:defRPr>
+            </a:lvl3pPr>
+            <a:lvl4pPr marL="1371600" indent="0" algn="ctr" defTabSz="914400" rtl="0" eaLnBrk="1" latinLnBrk="0" hangingPunct="1">
+              <a:spcBef>
+                <a:spcPct val="20000"/>
+              </a:spcBef>
+              <a:buFont typeface="Arial" pitchFamily="34" charset="0"/>
+              <a:buNone/>
+              <a:defRPr sz="2000" kern="1200">
+                <a:solidFill>
+                  <a:schemeClr val="tx1">
+                    <a:tint val="75000"/>
+                  </a:schemeClr>
+                </a:solidFill>
+                <a:latin typeface="+mn-lt"/>
+                <a:ea typeface="+mn-ea"/>
+                <a:cs typeface="+mn-cs"/>
+              </a:defRPr>
+            </a:lvl4pPr>
+            <a:lvl5pPr marL="1828800" indent="0" algn="ctr" defTabSz="914400" rtl="0" eaLnBrk="1" latinLnBrk="0" hangingPunct="1">
+              <a:spcBef>
+                <a:spcPct val="20000"/>
+              </a:spcBef>
+              <a:buFont typeface="Arial" pitchFamily="34" charset="0"/>
+              <a:buNone/>
+              <a:defRPr sz="2000" kern="1200">
+                <a:solidFill>
+                  <a:schemeClr val="tx1">
+                    <a:tint val="75000"/>
+                  </a:schemeClr>
+                </a:solidFill>
+                <a:latin typeface="+mn-lt"/>
+                <a:ea typeface="+mn-ea"/>
+                <a:cs typeface="+mn-cs"/>
+              </a:defRPr>
+            </a:lvl5pPr>
+            <a:lvl6pPr marL="2286000" indent="0" algn="ctr" defTabSz="914400" rtl="0" eaLnBrk="1" latinLnBrk="0" hangingPunct="1">
+              <a:spcBef>
+                <a:spcPct val="20000"/>
+              </a:spcBef>
+              <a:buFont typeface="Arial" pitchFamily="34" charset="0"/>
+              <a:buNone/>
+              <a:defRPr sz="2000" kern="1200">
+                <a:solidFill>
+                  <a:schemeClr val="tx1">
+                    <a:tint val="75000"/>
+                  </a:schemeClr>
+                </a:solidFill>
+                <a:latin typeface="+mn-lt"/>
+                <a:ea typeface="+mn-ea"/>
+                <a:cs typeface="+mn-cs"/>
+              </a:defRPr>
+            </a:lvl6pPr>
+            <a:lvl7pPr marL="2743200" indent="0" algn="ctr" defTabSz="914400" rtl="0" eaLnBrk="1" latinLnBrk="0" hangingPunct="1">
+              <a:spcBef>
+                <a:spcPct val="20000"/>
+              </a:spcBef>
+              <a:buFont typeface="Arial" pitchFamily="34" charset="0"/>
+              <a:buNone/>
+              <a:defRPr sz="2000" kern="1200">
+                <a:solidFill>
+                  <a:schemeClr val="tx1">
+                    <a:tint val="75000"/>
+                  </a:schemeClr>
+                </a:solidFill>
+                <a:latin typeface="+mn-lt"/>
+                <a:ea typeface="+mn-ea"/>
+                <a:cs typeface="+mn-cs"/>
+              </a:defRPr>
+            </a:lvl7pPr>
+            <a:lvl8pPr marL="3200400" indent="0" algn="ctr" defTabSz="914400" rtl="0" eaLnBrk="1" latinLnBrk="0" hangingPunct="1">
+              <a:spcBef>
+                <a:spcPct val="20000"/>
+              </a:spcBef>
+              <a:buFont typeface="Arial" pitchFamily="34" charset="0"/>
+              <a:buNone/>
+              <a:defRPr sz="2000" kern="1200">
+                <a:solidFill>
+                  <a:schemeClr val="tx1">
+                    <a:tint val="75000"/>
+                  </a:schemeClr>
+                </a:solidFill>
+                <a:latin typeface="+mn-lt"/>
+                <a:ea typeface="+mn-ea"/>
+                <a:cs typeface="+mn-cs"/>
+              </a:defRPr>
+            </a:lvl8pPr>
+            <a:lvl9pPr marL="3657600" indent="0" algn="ctr" defTabSz="914400" rtl="0" eaLnBrk="1" latinLnBrk="0" hangingPunct="1">
+              <a:spcBef>
+                <a:spcPct val="20000"/>
+              </a:spcBef>
+              <a:buFont typeface="Arial" pitchFamily="34" charset="0"/>
+              <a:buNone/>
+              <a:defRPr sz="2000" kern="1200">
+                <a:solidFill>
+                  <a:schemeClr val="tx1">
+                    <a:tint val="75000"/>
+                  </a:schemeClr>
+                </a:solidFill>
+                <a:latin typeface="+mn-lt"/>
+                <a:ea typeface="+mn-ea"/>
+                <a:cs typeface="+mn-cs"/>
+              </a:defRPr>
+            </a:lvl9pPr>
+          </a:lstStyle>
           <a:p>
             <a:pPr algn="l"/>
             <a:r>
               <a:rPr lang="en-US" dirty="0" smtClean="0"/>
-              <a:t>Remote connections </a:t>
-            </a:r>
-            <a:endParaRPr lang="en-US" dirty="0" smtClean="0"/>
+              <a:t>R Programming</a:t>
+            </a:r>
+          </a:p>
+          <a:p>
+            <a:pPr marL="457200" indent="-457200" algn="l">
+              <a:buFont typeface="Arial" pitchFamily="34" charset="0"/>
+              <a:buChar char="•"/>
+            </a:pPr>
+            <a:r>
+              <a:rPr lang="en-US" dirty="0" smtClean="0"/>
+              <a:t>The language</a:t>
+            </a:r>
+          </a:p>
+          <a:p>
+            <a:pPr marL="457200" indent="-457200" algn="l">
+              <a:buFont typeface="Arial" pitchFamily="34" charset="0"/>
+              <a:buChar char="•"/>
+            </a:pPr>
+            <a:r>
+              <a:rPr lang="en-US" dirty="0" smtClean="0"/>
+              <a:t>The ‘apply’ family</a:t>
+            </a:r>
+          </a:p>
+          <a:p>
+            <a:pPr marL="457200" indent="-457200" algn="l">
+              <a:buFont typeface="Arial" pitchFamily="34" charset="0"/>
+              <a:buChar char="•"/>
+            </a:pPr>
+            <a:r>
+              <a:rPr lang="en-US" dirty="0" smtClean="0"/>
+              <a:t>data.table</a:t>
+            </a:r>
           </a:p>
           <a:p>
             <a:pPr algn="l"/>
             <a:r>
               <a:rPr lang="en-US" dirty="0" smtClean="0"/>
-              <a:t>Using amazon AWS</a:t>
+              <a:t>Getting into R</a:t>
+            </a:r>
+          </a:p>
+          <a:p>
+            <a:pPr marL="457200" indent="-457200" algn="l">
+              <a:buFont typeface="Arial" pitchFamily="34" charset="0"/>
+              <a:buChar char="•"/>
+            </a:pPr>
+            <a:r>
+              <a:rPr lang="en-US" dirty="0" smtClean="0"/>
+              <a:t>Importing files</a:t>
+            </a:r>
+          </a:p>
+          <a:p>
+            <a:pPr marL="457200" indent="-457200" algn="l">
+              <a:buFont typeface="Arial" pitchFamily="34" charset="0"/>
+              <a:buChar char="•"/>
+            </a:pPr>
+            <a:r>
+              <a:rPr lang="en-US" dirty="0" smtClean="0"/>
+              <a:t>Regular expressions</a:t>
+            </a:r>
+          </a:p>
+          <a:p>
+            <a:pPr marL="457200" indent="-457200" algn="l">
+              <a:buFont typeface="Arial" pitchFamily="34" charset="0"/>
+              <a:buChar char="•"/>
+            </a:pPr>
+            <a:r>
+              <a:rPr lang="en-US" dirty="0" smtClean="0"/>
+              <a:t>Database connections</a:t>
+            </a:r>
+          </a:p>
+          <a:p>
+            <a:pPr marL="457200" indent="-457200" algn="l">
+              <a:buFont typeface="Arial" pitchFamily="34" charset="0"/>
+              <a:buChar char="•"/>
+            </a:pPr>
+            <a:r>
+              <a:rPr lang="en-US" dirty="0" smtClean="0"/>
+              <a:t>Dates</a:t>
+            </a:r>
+            <a:endParaRPr lang="en-US" dirty="0"/>
+          </a:p>
+        </p:txBody>
+      </p:sp>
+      <p:sp>
+        <p:nvSpPr>
+          <p:cNvPr id="5" name="Subtitle 2"/>
+          <p:cNvSpPr txBox="1">
+            <a:spLocks/>
+          </p:cNvSpPr>
+          <p:nvPr/>
+        </p:nvSpPr>
+        <p:spPr>
+          <a:xfrm>
+            <a:off x="5867400" y="3124200"/>
+            <a:ext cx="3124200" cy="2514600"/>
+          </a:xfrm>
+          <a:prstGeom prst="rect">
+            <a:avLst/>
+          </a:prstGeom>
+        </p:spPr>
+        <p:txBody>
+          <a:bodyPr vert="horz" lIns="91440" tIns="45720" rIns="91440" bIns="45720" rtlCol="0">
+            <a:normAutofit fontScale="55000" lnSpcReduction="20000"/>
+          </a:bodyPr>
+          <a:lstStyle>
+            <a:lvl1pPr marL="0" indent="0" algn="ctr" defTabSz="914400" rtl="0" eaLnBrk="1" latinLnBrk="0" hangingPunct="1">
+              <a:spcBef>
+                <a:spcPct val="20000"/>
+              </a:spcBef>
+              <a:buFont typeface="Arial" pitchFamily="34" charset="0"/>
+              <a:buNone/>
+              <a:defRPr sz="3200" kern="1200">
+                <a:solidFill>
+                  <a:schemeClr val="tx1">
+                    <a:tint val="75000"/>
+                  </a:schemeClr>
+                </a:solidFill>
+                <a:latin typeface="+mn-lt"/>
+                <a:ea typeface="+mn-ea"/>
+                <a:cs typeface="+mn-cs"/>
+              </a:defRPr>
+            </a:lvl1pPr>
+            <a:lvl2pPr marL="457200" indent="0" algn="ctr" defTabSz="914400" rtl="0" eaLnBrk="1" latinLnBrk="0" hangingPunct="1">
+              <a:spcBef>
+                <a:spcPct val="20000"/>
+              </a:spcBef>
+              <a:buFont typeface="Arial" pitchFamily="34" charset="0"/>
+              <a:buNone/>
+              <a:defRPr sz="2800" kern="1200">
+                <a:solidFill>
+                  <a:schemeClr val="tx1">
+                    <a:tint val="75000"/>
+                  </a:schemeClr>
+                </a:solidFill>
+                <a:latin typeface="+mn-lt"/>
+                <a:ea typeface="+mn-ea"/>
+                <a:cs typeface="+mn-cs"/>
+              </a:defRPr>
+            </a:lvl2pPr>
+            <a:lvl3pPr marL="914400" indent="0" algn="ctr" defTabSz="914400" rtl="0" eaLnBrk="1" latinLnBrk="0" hangingPunct="1">
+              <a:spcBef>
+                <a:spcPct val="20000"/>
+              </a:spcBef>
+              <a:buFont typeface="Arial" pitchFamily="34" charset="0"/>
+              <a:buNone/>
+              <a:defRPr sz="2400" kern="1200">
+                <a:solidFill>
+                  <a:schemeClr val="tx1">
+                    <a:tint val="75000"/>
+                  </a:schemeClr>
+                </a:solidFill>
+                <a:latin typeface="+mn-lt"/>
+                <a:ea typeface="+mn-ea"/>
+                <a:cs typeface="+mn-cs"/>
+              </a:defRPr>
+            </a:lvl3pPr>
+            <a:lvl4pPr marL="1371600" indent="0" algn="ctr" defTabSz="914400" rtl="0" eaLnBrk="1" latinLnBrk="0" hangingPunct="1">
+              <a:spcBef>
+                <a:spcPct val="20000"/>
+              </a:spcBef>
+              <a:buFont typeface="Arial" pitchFamily="34" charset="0"/>
+              <a:buNone/>
+              <a:defRPr sz="2000" kern="1200">
+                <a:solidFill>
+                  <a:schemeClr val="tx1">
+                    <a:tint val="75000"/>
+                  </a:schemeClr>
+                </a:solidFill>
+                <a:latin typeface="+mn-lt"/>
+                <a:ea typeface="+mn-ea"/>
+                <a:cs typeface="+mn-cs"/>
+              </a:defRPr>
+            </a:lvl4pPr>
+            <a:lvl5pPr marL="1828800" indent="0" algn="ctr" defTabSz="914400" rtl="0" eaLnBrk="1" latinLnBrk="0" hangingPunct="1">
+              <a:spcBef>
+                <a:spcPct val="20000"/>
+              </a:spcBef>
+              <a:buFont typeface="Arial" pitchFamily="34" charset="0"/>
+              <a:buNone/>
+              <a:defRPr sz="2000" kern="1200">
+                <a:solidFill>
+                  <a:schemeClr val="tx1">
+                    <a:tint val="75000"/>
+                  </a:schemeClr>
+                </a:solidFill>
+                <a:latin typeface="+mn-lt"/>
+                <a:ea typeface="+mn-ea"/>
+                <a:cs typeface="+mn-cs"/>
+              </a:defRPr>
+            </a:lvl5pPr>
+            <a:lvl6pPr marL="2286000" indent="0" algn="ctr" defTabSz="914400" rtl="0" eaLnBrk="1" latinLnBrk="0" hangingPunct="1">
+              <a:spcBef>
+                <a:spcPct val="20000"/>
+              </a:spcBef>
+              <a:buFont typeface="Arial" pitchFamily="34" charset="0"/>
+              <a:buNone/>
+              <a:defRPr sz="2000" kern="1200">
+                <a:solidFill>
+                  <a:schemeClr val="tx1">
+                    <a:tint val="75000"/>
+                  </a:schemeClr>
+                </a:solidFill>
+                <a:latin typeface="+mn-lt"/>
+                <a:ea typeface="+mn-ea"/>
+                <a:cs typeface="+mn-cs"/>
+              </a:defRPr>
+            </a:lvl6pPr>
+            <a:lvl7pPr marL="2743200" indent="0" algn="ctr" defTabSz="914400" rtl="0" eaLnBrk="1" latinLnBrk="0" hangingPunct="1">
+              <a:spcBef>
+                <a:spcPct val="20000"/>
+              </a:spcBef>
+              <a:buFont typeface="Arial" pitchFamily="34" charset="0"/>
+              <a:buNone/>
+              <a:defRPr sz="2000" kern="1200">
+                <a:solidFill>
+                  <a:schemeClr val="tx1">
+                    <a:tint val="75000"/>
+                  </a:schemeClr>
+                </a:solidFill>
+                <a:latin typeface="+mn-lt"/>
+                <a:ea typeface="+mn-ea"/>
+                <a:cs typeface="+mn-cs"/>
+              </a:defRPr>
+            </a:lvl7pPr>
+            <a:lvl8pPr marL="3200400" indent="0" algn="ctr" defTabSz="914400" rtl="0" eaLnBrk="1" latinLnBrk="0" hangingPunct="1">
+              <a:spcBef>
+                <a:spcPct val="20000"/>
+              </a:spcBef>
+              <a:buFont typeface="Arial" pitchFamily="34" charset="0"/>
+              <a:buNone/>
+              <a:defRPr sz="2000" kern="1200">
+                <a:solidFill>
+                  <a:schemeClr val="tx1">
+                    <a:tint val="75000"/>
+                  </a:schemeClr>
+                </a:solidFill>
+                <a:latin typeface="+mn-lt"/>
+                <a:ea typeface="+mn-ea"/>
+                <a:cs typeface="+mn-cs"/>
+              </a:defRPr>
+            </a:lvl8pPr>
+            <a:lvl9pPr marL="3657600" indent="0" algn="ctr" defTabSz="914400" rtl="0" eaLnBrk="1" latinLnBrk="0" hangingPunct="1">
+              <a:spcBef>
+                <a:spcPct val="20000"/>
+              </a:spcBef>
+              <a:buFont typeface="Arial" pitchFamily="34" charset="0"/>
+              <a:buNone/>
+              <a:defRPr sz="2000" kern="1200">
+                <a:solidFill>
+                  <a:schemeClr val="tx1">
+                    <a:tint val="75000"/>
+                  </a:schemeClr>
+                </a:solidFill>
+                <a:latin typeface="+mn-lt"/>
+                <a:ea typeface="+mn-ea"/>
+                <a:cs typeface="+mn-cs"/>
+              </a:defRPr>
+            </a:lvl9pPr>
+          </a:lstStyle>
+          <a:p>
+            <a:pPr algn="l"/>
+            <a:r>
+              <a:rPr lang="en-US" dirty="0" smtClean="0"/>
+              <a:t>Using R</a:t>
+            </a:r>
+          </a:p>
+          <a:p>
+            <a:pPr marL="457200" indent="-457200" algn="l">
+              <a:buFont typeface="Arial" pitchFamily="34" charset="0"/>
+              <a:buChar char="•"/>
+            </a:pPr>
+            <a:r>
+              <a:rPr lang="en-US" dirty="0" smtClean="0"/>
+              <a:t>Anatomy of a model</a:t>
+            </a:r>
+          </a:p>
+          <a:p>
+            <a:pPr marL="457200" indent="-457200" algn="l">
+              <a:buFont typeface="Arial" pitchFamily="34" charset="0"/>
+              <a:buChar char="•"/>
+            </a:pPr>
+            <a:r>
+              <a:rPr lang="en-US" dirty="0" smtClean="0"/>
+              <a:t>Graphics</a:t>
             </a:r>
           </a:p>
           <a:p>
@@ -3851,17 +4381,40 @@
           <a:p>
             <a:pPr algn="l"/>
             <a:r>
-              <a:rPr lang="en-US" dirty="0"/>
-              <a:t> </a:t>
-            </a:r>
-            <a:endParaRPr lang="en-US" dirty="0" smtClean="0"/>
-          </a:p>
-          <a:p>
-            <a:pPr algn="l"/>
-            <a:r>
-              <a:rPr lang="en-US" dirty="0"/>
-              <a:t> </a:t>
-            </a:r>
+              <a:rPr lang="en-US" dirty="0" smtClean="0"/>
+              <a:t>Lab / Application</a:t>
+            </a:r>
+          </a:p>
+          <a:p>
+            <a:pPr marL="457200" indent="-457200" algn="l">
+              <a:buFont typeface="Arial" pitchFamily="34" charset="0"/>
+              <a:buChar char="•"/>
+            </a:pPr>
+            <a:r>
+              <a:rPr lang="en-US" dirty="0" smtClean="0"/>
+              <a:t>Project example</a:t>
+            </a:r>
+          </a:p>
+          <a:p>
+            <a:pPr marL="457200" indent="-457200" algn="l">
+              <a:buFont typeface="Arial" pitchFamily="34" charset="0"/>
+              <a:buChar char="•"/>
+            </a:pPr>
+            <a:r>
+              <a:rPr lang="en-US" dirty="0" smtClean="0"/>
+              <a:t>Applying lecture notes to a “real” example</a:t>
+            </a:r>
+          </a:p>
+          <a:p>
+            <a:pPr marL="457200" indent="-457200" algn="l">
+              <a:buFont typeface="Arial" pitchFamily="34" charset="0"/>
+              <a:buChar char="•"/>
+            </a:pPr>
+            <a:r>
+              <a:rPr lang="en-US" dirty="0" smtClean="0"/>
+              <a:t>Intro to “getting out of R”</a:t>
+            </a:r>
+            <a:endParaRPr lang="en-US" dirty="0"/>
           </a:p>
         </p:txBody>
       </p:sp>
@@ -3885,6 +4438,1525 @@
 </p:sld>
 </file>
 
+<file path=ppt/slides/slide10.xml><?xml version="1.0" encoding="utf-8"?>
+<p:sld xmlns:a="http://schemas.openxmlformats.org/drawingml/2006/main" xmlns:r="http://schemas.openxmlformats.org/officeDocument/2006/relationships" xmlns:p="http://schemas.openxmlformats.org/presentationml/2006/main">
+  <p:cSld>
+    <p:spTree>
+      <p:nvGrpSpPr>
+        <p:cNvPr id="1" name=""/>
+        <p:cNvGrpSpPr/>
+        <p:nvPr/>
+      </p:nvGrpSpPr>
+      <p:grpSpPr>
+        <a:xfrm>
+          <a:off x="0" y="0"/>
+          <a:ext cx="0" cy="0"/>
+          <a:chOff x="0" y="0"/>
+          <a:chExt cx="0" cy="0"/>
+        </a:xfrm>
+      </p:grpSpPr>
+      <p:pic>
+        <p:nvPicPr>
+          <p:cNvPr id="4098" name="Picture 2"/>
+          <p:cNvPicPr>
+            <a:picLocks noChangeAspect="1" noChangeArrowheads="1"/>
+          </p:cNvPicPr>
+          <p:nvPr/>
+        </p:nvPicPr>
+        <p:blipFill>
+          <a:blip r:embed="rId2">
+            <a:extLst>
+              <a:ext uri="{28A0092B-C50C-407E-A947-70E740481C1C}">
+                <a14:useLocalDpi xmlns:a14="http://schemas.microsoft.com/office/drawing/2010/main" val="0"/>
+              </a:ext>
+            </a:extLst>
+          </a:blip>
+          <a:srcRect/>
+          <a:stretch>
+            <a:fillRect/>
+          </a:stretch>
+        </p:blipFill>
+        <p:spPr bwMode="auto">
+          <a:xfrm>
+            <a:off x="457200" y="533400"/>
+            <a:ext cx="8267571" cy="6157686"/>
+          </a:xfrm>
+          <a:prstGeom prst="rect">
+            <a:avLst/>
+          </a:prstGeom>
+          <a:noFill/>
+          <a:ln>
+            <a:noFill/>
+          </a:ln>
+          <a:extLst>
+            <a:ext uri="{909E8E84-426E-40DD-AFC4-6F175D3DCCD1}">
+              <a14:hiddenFill xmlns:a14="http://schemas.microsoft.com/office/drawing/2010/main">
+                <a:solidFill>
+                  <a:schemeClr val="accent1"/>
+                </a:solidFill>
+              </a14:hiddenFill>
+            </a:ext>
+            <a:ext uri="{91240B29-F687-4F45-9708-019B960494DF}">
+              <a14:hiddenLine xmlns:a14="http://schemas.microsoft.com/office/drawing/2010/main" w="9525">
+                <a:solidFill>
+                  <a:schemeClr val="tx1"/>
+                </a:solidFill>
+                <a:miter lim="800000"/>
+                <a:headEnd/>
+                <a:tailEnd/>
+              </a14:hiddenLine>
+            </a:ext>
+          </a:extLst>
+        </p:spPr>
+      </p:pic>
+    </p:spTree>
+    <p:extLst>
+      <p:ext uri="{BB962C8B-B14F-4D97-AF65-F5344CB8AC3E}">
+        <p14:creationId xmlns:p14="http://schemas.microsoft.com/office/powerpoint/2010/main" val="2644139054"/>
+      </p:ext>
+    </p:extLst>
+  </p:cSld>
+  <p:clrMapOvr>
+    <a:masterClrMapping/>
+  </p:clrMapOvr>
+</p:sld>
+</file>
+
+<file path=ppt/slides/slide11.xml><?xml version="1.0" encoding="utf-8"?>
+<p:sld xmlns:a="http://schemas.openxmlformats.org/drawingml/2006/main" xmlns:r="http://schemas.openxmlformats.org/officeDocument/2006/relationships" xmlns:p="http://schemas.openxmlformats.org/presentationml/2006/main">
+  <p:cSld>
+    <p:spTree>
+      <p:nvGrpSpPr>
+        <p:cNvPr id="1" name=""/>
+        <p:cNvGrpSpPr/>
+        <p:nvPr/>
+      </p:nvGrpSpPr>
+      <p:grpSpPr>
+        <a:xfrm>
+          <a:off x="0" y="0"/>
+          <a:ext cx="0" cy="0"/>
+          <a:chOff x="0" y="0"/>
+          <a:chExt cx="0" cy="0"/>
+        </a:xfrm>
+      </p:grpSpPr>
+      <p:sp>
+        <p:nvSpPr>
+          <p:cNvPr id="2" name="Title 1"/>
+          <p:cNvSpPr>
+            <a:spLocks noGrp="1"/>
+          </p:cNvSpPr>
+          <p:nvPr>
+            <p:ph type="title"/>
+          </p:nvPr>
+        </p:nvSpPr>
+        <p:spPr>
+          <a:xfrm>
+            <a:off x="1905000" y="274638"/>
+            <a:ext cx="6781800" cy="715962"/>
+          </a:xfrm>
+        </p:spPr>
+        <p:txBody>
+          <a:bodyPr>
+            <a:normAutofit fontScale="90000"/>
+          </a:bodyPr>
+          <a:lstStyle/>
+          <a:p>
+            <a:r>
+              <a:rPr lang="en-US" dirty="0" smtClean="0"/>
+              <a:t>Unit Tests</a:t>
+            </a:r>
+            <a:endParaRPr lang="en-US" dirty="0"/>
+          </a:p>
+        </p:txBody>
+      </p:sp>
+      <p:sp>
+        <p:nvSpPr>
+          <p:cNvPr id="3" name="Content Placeholder 2"/>
+          <p:cNvSpPr>
+            <a:spLocks noGrp="1"/>
+          </p:cNvSpPr>
+          <p:nvPr>
+            <p:ph idx="1"/>
+          </p:nvPr>
+        </p:nvSpPr>
+        <p:spPr>
+          <a:xfrm>
+            <a:off x="1828800" y="990600"/>
+            <a:ext cx="6781800" cy="1524000"/>
+          </a:xfrm>
+        </p:spPr>
+        <p:txBody>
+          <a:bodyPr>
+            <a:normAutofit fontScale="70000" lnSpcReduction="20000"/>
+          </a:bodyPr>
+          <a:lstStyle/>
+          <a:p>
+            <a:r>
+              <a:rPr lang="en-US" dirty="0" smtClean="0"/>
+              <a:t>RUnit is a good package to conduct automated unit testing</a:t>
+            </a:r>
+          </a:p>
+          <a:p>
+            <a:r>
+              <a:rPr lang="en-US" dirty="0" smtClean="0"/>
+              <a:t>Test just make sure that your code is doing what you expect with known inputs and known outputs</a:t>
+            </a:r>
+            <a:endParaRPr lang="en-US" dirty="0"/>
+          </a:p>
+        </p:txBody>
+      </p:sp>
+      <p:pic>
+        <p:nvPicPr>
+          <p:cNvPr id="6146" name="Picture 2"/>
+          <p:cNvPicPr>
+            <a:picLocks noChangeAspect="1" noChangeArrowheads="1"/>
+          </p:cNvPicPr>
+          <p:nvPr/>
+        </p:nvPicPr>
+        <p:blipFill>
+          <a:blip r:embed="rId2">
+            <a:extLst>
+              <a:ext uri="{28A0092B-C50C-407E-A947-70E740481C1C}">
+                <a14:useLocalDpi xmlns:a14="http://schemas.microsoft.com/office/drawing/2010/main" val="0"/>
+              </a:ext>
+            </a:extLst>
+          </a:blip>
+          <a:srcRect/>
+          <a:stretch>
+            <a:fillRect/>
+          </a:stretch>
+        </p:blipFill>
+        <p:spPr bwMode="auto">
+          <a:xfrm>
+            <a:off x="1676400" y="2728686"/>
+            <a:ext cx="6391275" cy="3448050"/>
+          </a:xfrm>
+          <a:prstGeom prst="rect">
+            <a:avLst/>
+          </a:prstGeom>
+          <a:noFill/>
+          <a:ln>
+            <a:noFill/>
+          </a:ln>
+          <a:extLst>
+            <a:ext uri="{909E8E84-426E-40DD-AFC4-6F175D3DCCD1}">
+              <a14:hiddenFill xmlns:a14="http://schemas.microsoft.com/office/drawing/2010/main">
+                <a:solidFill>
+                  <a:schemeClr val="accent1"/>
+                </a:solidFill>
+              </a14:hiddenFill>
+            </a:ext>
+            <a:ext uri="{91240B29-F687-4F45-9708-019B960494DF}">
+              <a14:hiddenLine xmlns:a14="http://schemas.microsoft.com/office/drawing/2010/main" w="9525">
+                <a:solidFill>
+                  <a:schemeClr val="tx1"/>
+                </a:solidFill>
+                <a:miter lim="800000"/>
+                <a:headEnd/>
+                <a:tailEnd/>
+              </a14:hiddenLine>
+            </a:ext>
+          </a:extLst>
+        </p:spPr>
+      </p:pic>
+    </p:spTree>
+    <p:extLst>
+      <p:ext uri="{BB962C8B-B14F-4D97-AF65-F5344CB8AC3E}">
+        <p14:creationId xmlns:p14="http://schemas.microsoft.com/office/powerpoint/2010/main" val="2991250354"/>
+      </p:ext>
+    </p:extLst>
+  </p:cSld>
+  <p:clrMapOvr>
+    <a:masterClrMapping/>
+  </p:clrMapOvr>
+</p:sld>
+</file>
+
+<file path=ppt/slides/slide12.xml><?xml version="1.0" encoding="utf-8"?>
+<p:sld xmlns:a="http://schemas.openxmlformats.org/drawingml/2006/main" xmlns:r="http://schemas.openxmlformats.org/officeDocument/2006/relationships" xmlns:p="http://schemas.openxmlformats.org/presentationml/2006/main">
+  <p:cSld>
+    <p:spTree>
+      <p:nvGrpSpPr>
+        <p:cNvPr id="1" name=""/>
+        <p:cNvGrpSpPr/>
+        <p:nvPr/>
+      </p:nvGrpSpPr>
+      <p:grpSpPr>
+        <a:xfrm>
+          <a:off x="0" y="0"/>
+          <a:ext cx="0" cy="0"/>
+          <a:chOff x="0" y="0"/>
+          <a:chExt cx="0" cy="0"/>
+        </a:xfrm>
+      </p:grpSpPr>
+      <p:sp>
+        <p:nvSpPr>
+          <p:cNvPr id="2" name="Title 1"/>
+          <p:cNvSpPr>
+            <a:spLocks noGrp="1"/>
+          </p:cNvSpPr>
+          <p:nvPr>
+            <p:ph type="title"/>
+          </p:nvPr>
+        </p:nvSpPr>
+        <p:spPr>
+          <a:xfrm>
+            <a:off x="1905000" y="274638"/>
+            <a:ext cx="6781800" cy="715962"/>
+          </a:xfrm>
+        </p:spPr>
+        <p:txBody>
+          <a:bodyPr>
+            <a:normAutofit fontScale="90000"/>
+          </a:bodyPr>
+          <a:lstStyle/>
+          <a:p>
+            <a:r>
+              <a:rPr lang="en-US" dirty="0" smtClean="0"/>
+              <a:t>Continuous Integration tests</a:t>
+            </a:r>
+            <a:endParaRPr lang="en-US" dirty="0"/>
+          </a:p>
+        </p:txBody>
+      </p:sp>
+      <p:sp>
+        <p:nvSpPr>
+          <p:cNvPr id="3" name="Content Placeholder 2"/>
+          <p:cNvSpPr>
+            <a:spLocks noGrp="1"/>
+          </p:cNvSpPr>
+          <p:nvPr>
+            <p:ph idx="1"/>
+          </p:nvPr>
+        </p:nvSpPr>
+        <p:spPr>
+          <a:xfrm>
+            <a:off x="1295400" y="2590800"/>
+            <a:ext cx="2590800" cy="2979057"/>
+          </a:xfrm>
+        </p:spPr>
+        <p:txBody>
+          <a:bodyPr>
+            <a:noAutofit/>
+          </a:bodyPr>
+          <a:lstStyle/>
+          <a:p>
+            <a:pPr marL="0" indent="0">
+              <a:buNone/>
+            </a:pPr>
+            <a:r>
+              <a:rPr lang="en-US" sz="2000" dirty="0" smtClean="0"/>
+              <a:t>Github also supports </a:t>
+            </a:r>
+            <a:r>
+              <a:rPr lang="en-US" sz="2000" dirty="0" err="1" smtClean="0"/>
+              <a:t>travis</a:t>
+            </a:r>
+            <a:r>
+              <a:rPr lang="en-US" sz="2000" dirty="0" smtClean="0"/>
+              <a:t>-ci, which can tell you if your current “build” passes your tests.</a:t>
+            </a:r>
+          </a:p>
+          <a:p>
+            <a:pPr marL="0" indent="0">
+              <a:buNone/>
+            </a:pPr>
+            <a:r>
+              <a:rPr lang="en-US" sz="2000" dirty="0" smtClean="0">
+                <a:hlinkClick r:id="rId2"/>
+              </a:rPr>
+              <a:t>https</a:t>
+            </a:r>
+            <a:r>
+              <a:rPr lang="en-US" sz="2000" dirty="0">
+                <a:hlinkClick r:id="rId2"/>
+              </a:rPr>
+              <a:t>://travis-ci.org</a:t>
+            </a:r>
+            <a:endParaRPr lang="en-US" sz="2000" dirty="0"/>
+          </a:p>
+          <a:p>
+            <a:endParaRPr lang="en-US" sz="2000" dirty="0" smtClean="0"/>
+          </a:p>
+          <a:p>
+            <a:pPr marL="0" indent="0">
+              <a:buNone/>
+            </a:pPr>
+            <a:endParaRPr lang="en-US" sz="2000" dirty="0"/>
+          </a:p>
+        </p:txBody>
+      </p:sp>
+      <p:pic>
+        <p:nvPicPr>
+          <p:cNvPr id="7170" name="Picture 2"/>
+          <p:cNvPicPr>
+            <a:picLocks noChangeAspect="1" noChangeArrowheads="1"/>
+          </p:cNvPicPr>
+          <p:nvPr/>
+        </p:nvPicPr>
+        <p:blipFill>
+          <a:blip r:embed="rId3">
+            <a:extLst>
+              <a:ext uri="{28A0092B-C50C-407E-A947-70E740481C1C}">
+                <a14:useLocalDpi xmlns:a14="http://schemas.microsoft.com/office/drawing/2010/main" val="0"/>
+              </a:ext>
+            </a:extLst>
+          </a:blip>
+          <a:srcRect/>
+          <a:stretch>
+            <a:fillRect/>
+          </a:stretch>
+        </p:blipFill>
+        <p:spPr bwMode="auto">
+          <a:xfrm>
+            <a:off x="4067629" y="1447800"/>
+            <a:ext cx="4699512" cy="4343400"/>
+          </a:xfrm>
+          <a:prstGeom prst="rect">
+            <a:avLst/>
+          </a:prstGeom>
+          <a:noFill/>
+          <a:ln>
+            <a:noFill/>
+          </a:ln>
+          <a:extLst>
+            <a:ext uri="{909E8E84-426E-40DD-AFC4-6F175D3DCCD1}">
+              <a14:hiddenFill xmlns:a14="http://schemas.microsoft.com/office/drawing/2010/main">
+                <a:solidFill>
+                  <a:schemeClr val="accent1"/>
+                </a:solidFill>
+              </a14:hiddenFill>
+            </a:ext>
+            <a:ext uri="{91240B29-F687-4F45-9708-019B960494DF}">
+              <a14:hiddenLine xmlns:a14="http://schemas.microsoft.com/office/drawing/2010/main" w="9525">
+                <a:solidFill>
+                  <a:schemeClr val="tx1"/>
+                </a:solidFill>
+                <a:miter lim="800000"/>
+                <a:headEnd/>
+                <a:tailEnd/>
+              </a14:hiddenLine>
+            </a:ext>
+          </a:extLst>
+        </p:spPr>
+      </p:pic>
+      <p:sp>
+        <p:nvSpPr>
+          <p:cNvPr id="4" name="Oval 3"/>
+          <p:cNvSpPr/>
+          <p:nvPr/>
+        </p:nvSpPr>
+        <p:spPr>
+          <a:xfrm>
+            <a:off x="3581400" y="3352800"/>
+            <a:ext cx="1952171" cy="647700"/>
+          </a:xfrm>
+          <a:prstGeom prst="ellipse">
+            <a:avLst/>
+          </a:prstGeom>
+          <a:solidFill>
+            <a:srgbClr val="FFFF00">
+              <a:alpha val="10000"/>
+            </a:srgbClr>
+          </a:solidFill>
+          <a:ln>
+            <a:solidFill>
+              <a:schemeClr val="accent6">
+                <a:lumMod val="60000"/>
+                <a:lumOff val="40000"/>
+              </a:schemeClr>
+            </a:solidFill>
+          </a:ln>
+        </p:spPr>
+        <p:style>
+          <a:lnRef idx="2">
+            <a:schemeClr val="accent1">
+              <a:shade val="50000"/>
+            </a:schemeClr>
+          </a:lnRef>
+          <a:fillRef idx="1">
+            <a:schemeClr val="accent1"/>
+          </a:fillRef>
+          <a:effectRef idx="0">
+            <a:schemeClr val="accent1"/>
+          </a:effectRef>
+          <a:fontRef idx="minor">
+            <a:schemeClr val="lt1"/>
+          </a:fontRef>
+        </p:style>
+        <p:txBody>
+          <a:bodyPr rtlCol="0" anchor="ctr"/>
+          <a:lstStyle/>
+          <a:p>
+            <a:pPr algn="ctr"/>
+            <a:endParaRPr lang="en-US"/>
+          </a:p>
+        </p:txBody>
+      </p:sp>
+    </p:spTree>
+    <p:extLst>
+      <p:ext uri="{BB962C8B-B14F-4D97-AF65-F5344CB8AC3E}">
+        <p14:creationId xmlns:p14="http://schemas.microsoft.com/office/powerpoint/2010/main" val="1548281101"/>
+      </p:ext>
+    </p:extLst>
+  </p:cSld>
+  <p:clrMapOvr>
+    <a:masterClrMapping/>
+  </p:clrMapOvr>
+</p:sld>
+</file>
+
+<file path=ppt/slides/slide13.xml><?xml version="1.0" encoding="utf-8"?>
+<p:sld xmlns:a="http://schemas.openxmlformats.org/drawingml/2006/main" xmlns:r="http://schemas.openxmlformats.org/officeDocument/2006/relationships" xmlns:p="http://schemas.openxmlformats.org/presentationml/2006/main">
+  <p:cSld>
+    <p:spTree>
+      <p:nvGrpSpPr>
+        <p:cNvPr id="1" name=""/>
+        <p:cNvGrpSpPr/>
+        <p:nvPr/>
+      </p:nvGrpSpPr>
+      <p:grpSpPr>
+        <a:xfrm>
+          <a:off x="0" y="0"/>
+          <a:ext cx="0" cy="0"/>
+          <a:chOff x="0" y="0"/>
+          <a:chExt cx="0" cy="0"/>
+        </a:xfrm>
+      </p:grpSpPr>
+      <p:sp>
+        <p:nvSpPr>
+          <p:cNvPr id="2" name="Title 1"/>
+          <p:cNvSpPr>
+            <a:spLocks noGrp="1"/>
+          </p:cNvSpPr>
+          <p:nvPr>
+            <p:ph type="title"/>
+          </p:nvPr>
+        </p:nvSpPr>
+        <p:spPr>
+          <a:xfrm>
+            <a:off x="1905000" y="274638"/>
+            <a:ext cx="6781800" cy="563562"/>
+          </a:xfrm>
+        </p:spPr>
+        <p:txBody>
+          <a:bodyPr>
+            <a:normAutofit fontScale="90000"/>
+          </a:bodyPr>
+          <a:lstStyle/>
+          <a:p>
+            <a:r>
+              <a:rPr lang="en-US" dirty="0"/>
+              <a:t>Everything is an “Object”</a:t>
+            </a:r>
+          </a:p>
+        </p:txBody>
+      </p:sp>
+      <p:sp>
+        <p:nvSpPr>
+          <p:cNvPr id="3" name="Content Placeholder 2"/>
+          <p:cNvSpPr>
+            <a:spLocks noGrp="1"/>
+          </p:cNvSpPr>
+          <p:nvPr>
+            <p:ph idx="1"/>
+          </p:nvPr>
+        </p:nvSpPr>
+        <p:spPr>
+          <a:xfrm>
+            <a:off x="1479842" y="1600200"/>
+            <a:ext cx="2939758" cy="4525963"/>
+          </a:xfrm>
+        </p:spPr>
+        <p:txBody>
+          <a:bodyPr>
+            <a:normAutofit fontScale="62500" lnSpcReduction="20000"/>
+          </a:bodyPr>
+          <a:lstStyle/>
+          <a:p>
+            <a:pPr marL="0" indent="0">
+              <a:buNone/>
+            </a:pPr>
+            <a:r>
+              <a:rPr lang="en-US" dirty="0" smtClean="0"/>
+              <a:t>Objects can be made on the fly, and can change class (on the fly)</a:t>
+            </a:r>
+          </a:p>
+          <a:p>
+            <a:endParaRPr lang="en-US" dirty="0" smtClean="0"/>
+          </a:p>
+          <a:p>
+            <a:endParaRPr lang="en-US" dirty="0" smtClean="0"/>
+          </a:p>
+          <a:p>
+            <a:endParaRPr lang="en-US" dirty="0" smtClean="0"/>
+          </a:p>
+          <a:p>
+            <a:pPr marL="0" indent="0">
+              <a:buNone/>
+            </a:pPr>
+            <a:r>
+              <a:rPr lang="en-US" dirty="0" smtClean="0"/>
+              <a:t>Objects can have names, but those names are ultimately just attributes</a:t>
+            </a:r>
+          </a:p>
+          <a:p>
+            <a:endParaRPr lang="en-US" dirty="0" smtClean="0"/>
+          </a:p>
+          <a:p>
+            <a:endParaRPr lang="en-US" dirty="0" smtClean="0"/>
+          </a:p>
+          <a:p>
+            <a:endParaRPr lang="en-US" dirty="0" smtClean="0"/>
+          </a:p>
+          <a:p>
+            <a:pPr marL="0" indent="0">
+              <a:buNone/>
+            </a:pPr>
+            <a:r>
+              <a:rPr lang="en-US" dirty="0" smtClean="0"/>
+              <a:t>You can set your own attributes… which may or may not be meaningful</a:t>
+            </a:r>
+          </a:p>
+        </p:txBody>
+      </p:sp>
+      <p:pic>
+        <p:nvPicPr>
+          <p:cNvPr id="4" name="Picture 2"/>
+          <p:cNvPicPr>
+            <a:picLocks noChangeAspect="1" noChangeArrowheads="1"/>
+          </p:cNvPicPr>
+          <p:nvPr/>
+        </p:nvPicPr>
+        <p:blipFill>
+          <a:blip r:embed="rId2">
+            <a:extLst>
+              <a:ext uri="{28A0092B-C50C-407E-A947-70E740481C1C}">
+                <a14:useLocalDpi xmlns:a14="http://schemas.microsoft.com/office/drawing/2010/main" val="0"/>
+              </a:ext>
+            </a:extLst>
+          </a:blip>
+          <a:srcRect/>
+          <a:stretch>
+            <a:fillRect/>
+          </a:stretch>
+        </p:blipFill>
+        <p:spPr bwMode="auto">
+          <a:xfrm>
+            <a:off x="4815113" y="990600"/>
+            <a:ext cx="3487143" cy="1676399"/>
+          </a:xfrm>
+          <a:prstGeom prst="rect">
+            <a:avLst/>
+          </a:prstGeom>
+          <a:noFill/>
+          <a:ln w="9525">
+            <a:solidFill>
+              <a:schemeClr val="tx1"/>
+            </a:solidFill>
+            <a:miter lim="800000"/>
+            <a:headEnd/>
+            <a:tailEnd/>
+          </a:ln>
+          <a:extLst>
+            <a:ext uri="{909E8E84-426E-40DD-AFC4-6F175D3DCCD1}">
+              <a14:hiddenFill xmlns:a14="http://schemas.microsoft.com/office/drawing/2010/main">
+                <a:solidFill>
+                  <a:schemeClr val="accent1"/>
+                </a:solidFill>
+              </a14:hiddenFill>
+            </a:ext>
+          </a:extLst>
+        </p:spPr>
+      </p:pic>
+      <p:pic>
+        <p:nvPicPr>
+          <p:cNvPr id="9218" name="Picture 2"/>
+          <p:cNvPicPr>
+            <a:picLocks noChangeAspect="1" noChangeArrowheads="1"/>
+          </p:cNvPicPr>
+          <p:nvPr/>
+        </p:nvPicPr>
+        <p:blipFill>
+          <a:blip r:embed="rId3">
+            <a:extLst>
+              <a:ext uri="{28A0092B-C50C-407E-A947-70E740481C1C}">
+                <a14:useLocalDpi xmlns:a14="http://schemas.microsoft.com/office/drawing/2010/main" val="0"/>
+              </a:ext>
+            </a:extLst>
+          </a:blip>
+          <a:srcRect/>
+          <a:stretch>
+            <a:fillRect/>
+          </a:stretch>
+        </p:blipFill>
+        <p:spPr bwMode="auto">
+          <a:xfrm>
+            <a:off x="5271815" y="2819400"/>
+            <a:ext cx="2923442" cy="1809750"/>
+          </a:xfrm>
+          <a:prstGeom prst="rect">
+            <a:avLst/>
+          </a:prstGeom>
+          <a:noFill/>
+          <a:ln w="9525">
+            <a:solidFill>
+              <a:schemeClr val="tx1"/>
+            </a:solidFill>
+            <a:miter lim="800000"/>
+            <a:headEnd/>
+            <a:tailEnd/>
+          </a:ln>
+          <a:extLst>
+            <a:ext uri="{909E8E84-426E-40DD-AFC4-6F175D3DCCD1}">
+              <a14:hiddenFill xmlns:a14="http://schemas.microsoft.com/office/drawing/2010/main">
+                <a:solidFill>
+                  <a:schemeClr val="accent1"/>
+                </a:solidFill>
+              </a14:hiddenFill>
+            </a:ext>
+          </a:extLst>
+        </p:spPr>
+      </p:pic>
+      <p:pic>
+        <p:nvPicPr>
+          <p:cNvPr id="9219" name="Picture 3"/>
+          <p:cNvPicPr>
+            <a:picLocks noChangeAspect="1" noChangeArrowheads="1"/>
+          </p:cNvPicPr>
+          <p:nvPr/>
+        </p:nvPicPr>
+        <p:blipFill>
+          <a:blip r:embed="rId4">
+            <a:extLst>
+              <a:ext uri="{28A0092B-C50C-407E-A947-70E740481C1C}">
+                <a14:useLocalDpi xmlns:a14="http://schemas.microsoft.com/office/drawing/2010/main" val="0"/>
+              </a:ext>
+            </a:extLst>
+          </a:blip>
+          <a:srcRect/>
+          <a:stretch>
+            <a:fillRect/>
+          </a:stretch>
+        </p:blipFill>
+        <p:spPr bwMode="auto">
+          <a:xfrm>
+            <a:off x="4572000" y="4876800"/>
+            <a:ext cx="4495800" cy="1819275"/>
+          </a:xfrm>
+          <a:prstGeom prst="rect">
+            <a:avLst/>
+          </a:prstGeom>
+          <a:noFill/>
+          <a:ln w="9525">
+            <a:solidFill>
+              <a:schemeClr val="tx1"/>
+            </a:solidFill>
+            <a:miter lim="800000"/>
+            <a:headEnd/>
+            <a:tailEnd/>
+          </a:ln>
+          <a:extLst>
+            <a:ext uri="{909E8E84-426E-40DD-AFC4-6F175D3DCCD1}">
+              <a14:hiddenFill xmlns:a14="http://schemas.microsoft.com/office/drawing/2010/main">
+                <a:solidFill>
+                  <a:schemeClr val="accent1"/>
+                </a:solidFill>
+              </a14:hiddenFill>
+            </a:ext>
+          </a:extLst>
+        </p:spPr>
+      </p:pic>
+    </p:spTree>
+    <p:extLst>
+      <p:ext uri="{BB962C8B-B14F-4D97-AF65-F5344CB8AC3E}">
+        <p14:creationId xmlns:p14="http://schemas.microsoft.com/office/powerpoint/2010/main" val="1313966895"/>
+      </p:ext>
+    </p:extLst>
+  </p:cSld>
+  <p:clrMapOvr>
+    <a:masterClrMapping/>
+  </p:clrMapOvr>
+</p:sld>
+</file>
+
+<file path=ppt/slides/slide14.xml><?xml version="1.0" encoding="utf-8"?>
+<p:sld xmlns:a="http://schemas.openxmlformats.org/drawingml/2006/main" xmlns:r="http://schemas.openxmlformats.org/officeDocument/2006/relationships" xmlns:p="http://schemas.openxmlformats.org/presentationml/2006/main">
+  <p:cSld>
+    <p:spTree>
+      <p:nvGrpSpPr>
+        <p:cNvPr id="1" name=""/>
+        <p:cNvGrpSpPr/>
+        <p:nvPr/>
+      </p:nvGrpSpPr>
+      <p:grpSpPr>
+        <a:xfrm>
+          <a:off x="0" y="0"/>
+          <a:ext cx="0" cy="0"/>
+          <a:chOff x="0" y="0"/>
+          <a:chExt cx="0" cy="0"/>
+        </a:xfrm>
+      </p:grpSpPr>
+      <p:sp>
+        <p:nvSpPr>
+          <p:cNvPr id="2" name="Title 1"/>
+          <p:cNvSpPr>
+            <a:spLocks noGrp="1"/>
+          </p:cNvSpPr>
+          <p:nvPr>
+            <p:ph type="title"/>
+          </p:nvPr>
+        </p:nvSpPr>
+        <p:spPr/>
+        <p:txBody>
+          <a:bodyPr>
+            <a:noAutofit/>
+          </a:bodyPr>
+          <a:lstStyle/>
+          <a:p>
+            <a:r>
+              <a:rPr lang="en-US" sz="2800" dirty="0" smtClean="0"/>
+              <a:t>Question: What happens if you use the wrong dimensions?</a:t>
+            </a:r>
+            <a:endParaRPr lang="en-US" sz="2800" dirty="0"/>
+          </a:p>
+        </p:txBody>
+      </p:sp>
+      <p:sp>
+        <p:nvSpPr>
+          <p:cNvPr id="3" name="Content Placeholder 2"/>
+          <p:cNvSpPr>
+            <a:spLocks noGrp="1"/>
+          </p:cNvSpPr>
+          <p:nvPr>
+            <p:ph idx="1"/>
+          </p:nvPr>
+        </p:nvSpPr>
+        <p:spPr>
+          <a:xfrm>
+            <a:off x="1905000" y="4495800"/>
+            <a:ext cx="6781800" cy="1630363"/>
+          </a:xfrm>
+        </p:spPr>
+        <p:txBody>
+          <a:bodyPr>
+            <a:normAutofit fontScale="77500" lnSpcReduction="20000"/>
+          </a:bodyPr>
+          <a:lstStyle/>
+          <a:p>
+            <a:pPr marL="0" indent="0">
+              <a:buNone/>
+            </a:pPr>
+            <a:r>
+              <a:rPr lang="en-US" dirty="0" smtClean="0"/>
+              <a:t>Try it!</a:t>
+            </a:r>
+          </a:p>
+          <a:p>
+            <a:r>
+              <a:rPr lang="en-US" dirty="0" smtClean="0"/>
+              <a:t>Change c(3,3) to something else</a:t>
+            </a:r>
+          </a:p>
+          <a:p>
+            <a:r>
+              <a:rPr lang="en-US" dirty="0" smtClean="0"/>
+              <a:t>Change Something to be 1:7 (or whatever)</a:t>
+            </a:r>
+          </a:p>
+          <a:p>
+            <a:r>
+              <a:rPr lang="en-US" dirty="0" smtClean="0"/>
+              <a:t>Did you get an error??</a:t>
+            </a:r>
+            <a:endParaRPr lang="en-US" dirty="0"/>
+          </a:p>
+        </p:txBody>
+      </p:sp>
+      <p:pic>
+        <p:nvPicPr>
+          <p:cNvPr id="5" name="Picture 3"/>
+          <p:cNvPicPr>
+            <a:picLocks noChangeAspect="1" noChangeArrowheads="1"/>
+          </p:cNvPicPr>
+          <p:nvPr/>
+        </p:nvPicPr>
+        <p:blipFill>
+          <a:blip r:embed="rId2">
+            <a:extLst>
+              <a:ext uri="{28A0092B-C50C-407E-A947-70E740481C1C}">
+                <a14:useLocalDpi xmlns:a14="http://schemas.microsoft.com/office/drawing/2010/main" val="0"/>
+              </a:ext>
+            </a:extLst>
+          </a:blip>
+          <a:srcRect/>
+          <a:stretch>
+            <a:fillRect/>
+          </a:stretch>
+        </p:blipFill>
+        <p:spPr bwMode="auto">
+          <a:xfrm>
+            <a:off x="2667000" y="1981200"/>
+            <a:ext cx="4495800" cy="1819275"/>
+          </a:xfrm>
+          <a:prstGeom prst="rect">
+            <a:avLst/>
+          </a:prstGeom>
+          <a:noFill/>
+          <a:ln w="9525">
+            <a:solidFill>
+              <a:schemeClr val="tx1"/>
+            </a:solidFill>
+            <a:miter lim="800000"/>
+            <a:headEnd/>
+            <a:tailEnd/>
+          </a:ln>
+          <a:extLst>
+            <a:ext uri="{909E8E84-426E-40DD-AFC4-6F175D3DCCD1}">
+              <a14:hiddenFill xmlns:a14="http://schemas.microsoft.com/office/drawing/2010/main">
+                <a:solidFill>
+                  <a:schemeClr val="accent1"/>
+                </a:solidFill>
+              </a14:hiddenFill>
+            </a:ext>
+          </a:extLst>
+        </p:spPr>
+      </p:pic>
+    </p:spTree>
+    <p:extLst>
+      <p:ext uri="{BB962C8B-B14F-4D97-AF65-F5344CB8AC3E}">
+        <p14:creationId xmlns:p14="http://schemas.microsoft.com/office/powerpoint/2010/main" val="3000170474"/>
+      </p:ext>
+    </p:extLst>
+  </p:cSld>
+  <p:clrMapOvr>
+    <a:masterClrMapping/>
+  </p:clrMapOvr>
+</p:sld>
+</file>
+
+<file path=ppt/slides/slide15.xml><?xml version="1.0" encoding="utf-8"?>
+<p:sld xmlns:a="http://schemas.openxmlformats.org/drawingml/2006/main" xmlns:r="http://schemas.openxmlformats.org/officeDocument/2006/relationships" xmlns:p="http://schemas.openxmlformats.org/presentationml/2006/main">
+  <p:cSld>
+    <p:spTree>
+      <p:nvGrpSpPr>
+        <p:cNvPr id="1" name=""/>
+        <p:cNvGrpSpPr/>
+        <p:nvPr/>
+      </p:nvGrpSpPr>
+      <p:grpSpPr>
+        <a:xfrm>
+          <a:off x="0" y="0"/>
+          <a:ext cx="0" cy="0"/>
+          <a:chOff x="0" y="0"/>
+          <a:chExt cx="0" cy="0"/>
+        </a:xfrm>
+      </p:grpSpPr>
+      <p:sp>
+        <p:nvSpPr>
+          <p:cNvPr id="2" name="Title 1"/>
+          <p:cNvSpPr>
+            <a:spLocks noGrp="1"/>
+          </p:cNvSpPr>
+          <p:nvPr>
+            <p:ph type="title"/>
+          </p:nvPr>
+        </p:nvSpPr>
+        <p:spPr/>
+        <p:txBody>
+          <a:bodyPr>
+            <a:normAutofit fontScale="90000"/>
+          </a:bodyPr>
+          <a:lstStyle/>
+          <a:p>
+            <a:r>
+              <a:rPr lang="en-US" dirty="0" smtClean="0"/>
+              <a:t>Language Review / Resources </a:t>
+            </a:r>
+            <a:endParaRPr lang="en-US" dirty="0"/>
+          </a:p>
+        </p:txBody>
+      </p:sp>
+      <p:sp>
+        <p:nvSpPr>
+          <p:cNvPr id="3" name="Content Placeholder 2"/>
+          <p:cNvSpPr>
+            <a:spLocks noGrp="1"/>
+          </p:cNvSpPr>
+          <p:nvPr>
+            <p:ph idx="1"/>
+          </p:nvPr>
+        </p:nvSpPr>
+        <p:spPr>
+          <a:xfrm>
+            <a:off x="1600200" y="1600201"/>
+            <a:ext cx="7315200" cy="2514599"/>
+          </a:xfrm>
+        </p:spPr>
+        <p:txBody>
+          <a:bodyPr>
+            <a:normAutofit fontScale="47500" lnSpcReduction="20000"/>
+          </a:bodyPr>
+          <a:lstStyle/>
+          <a:p>
+            <a:pPr marL="0" indent="0">
+              <a:buNone/>
+            </a:pPr>
+            <a:endParaRPr lang="en-US" dirty="0" smtClean="0"/>
+          </a:p>
+          <a:p>
+            <a:pPr marL="0" indent="0">
+              <a:buNone/>
+            </a:pPr>
+            <a:r>
+              <a:rPr lang="en-US" dirty="0" smtClean="0"/>
+              <a:t>Best cheat sheet ever:</a:t>
+            </a:r>
+          </a:p>
+          <a:p>
+            <a:r>
+              <a:rPr lang="en-US" dirty="0">
+                <a:hlinkClick r:id="rId2"/>
+              </a:rPr>
+              <a:t>http://cran.r-project.org/doc/contrib/Short-refcard.pdf</a:t>
+            </a:r>
+            <a:endParaRPr lang="en-US" dirty="0"/>
+          </a:p>
+          <a:p>
+            <a:pPr marL="0" indent="0">
+              <a:buNone/>
+            </a:pPr>
+            <a:r>
+              <a:rPr lang="en-US" dirty="0"/>
+              <a:t>Google's YouTube guide to R </a:t>
+            </a:r>
+          </a:p>
+          <a:p>
+            <a:r>
+              <a:rPr lang="en-US" dirty="0">
+                <a:hlinkClick r:id="rId3"/>
+              </a:rPr>
+              <a:t>https://www.youtube.com/playlist?list=PLOU2XLYxmsIK9qQfztXeybpHvru-TrqAP</a:t>
+            </a:r>
+            <a:endParaRPr lang="en-US" dirty="0"/>
+          </a:p>
+          <a:p>
+            <a:pPr marL="0" indent="0">
+              <a:buNone/>
+            </a:pPr>
+            <a:r>
+              <a:rPr lang="en-US" dirty="0" smtClean="0"/>
+              <a:t>Review </a:t>
+            </a:r>
+          </a:p>
+          <a:p>
+            <a:r>
+              <a:rPr lang="en-US" dirty="0" smtClean="0">
+                <a:hlinkClick r:id="rId4"/>
+              </a:rPr>
+              <a:t>http</a:t>
+            </a:r>
+            <a:r>
+              <a:rPr lang="en-US" dirty="0">
+                <a:hlinkClick r:id="rId4"/>
+              </a:rPr>
+              <a:t>://</a:t>
+            </a:r>
+            <a:r>
+              <a:rPr lang="en-US" dirty="0" smtClean="0">
+                <a:hlinkClick r:id="rId4"/>
+              </a:rPr>
+              <a:t>faculty.chicagobooth.edu/matt.taddy/teaching/R_QRC.pdf</a:t>
+            </a:r>
+            <a:endParaRPr lang="en-US" dirty="0" smtClean="0"/>
+          </a:p>
+          <a:p>
+            <a:pPr marL="0" indent="0">
+              <a:buNone/>
+            </a:pPr>
+            <a:r>
+              <a:rPr lang="en-US" dirty="0" smtClean="0"/>
+              <a:t>Google's </a:t>
+            </a:r>
+            <a:r>
+              <a:rPr lang="en-US" dirty="0"/>
+              <a:t>YouTube guide to R </a:t>
+            </a:r>
+            <a:endParaRPr lang="en-US" dirty="0" smtClean="0"/>
+          </a:p>
+          <a:p>
+            <a:r>
+              <a:rPr lang="en-US" dirty="0" smtClean="0">
+                <a:hlinkClick r:id="rId5"/>
+              </a:rPr>
+              <a:t>http</a:t>
+            </a:r>
+            <a:r>
+              <a:rPr lang="en-US" dirty="0">
+                <a:hlinkClick r:id="rId5"/>
+              </a:rPr>
+              <a:t>://</a:t>
+            </a:r>
+            <a:r>
+              <a:rPr lang="en-US" dirty="0" smtClean="0">
+                <a:hlinkClick r:id="rId5"/>
+              </a:rPr>
+              <a:t>data.princeton.edu/R/linearModels.html</a:t>
+            </a:r>
+            <a:endParaRPr lang="en-US" dirty="0" smtClean="0"/>
+          </a:p>
+          <a:p>
+            <a:endParaRPr lang="en-US" dirty="0" smtClean="0"/>
+          </a:p>
+          <a:p>
+            <a:endParaRPr lang="en-US" dirty="0"/>
+          </a:p>
+        </p:txBody>
+      </p:sp>
+    </p:spTree>
+    <p:extLst>
+      <p:ext uri="{BB962C8B-B14F-4D97-AF65-F5344CB8AC3E}">
+        <p14:creationId xmlns:p14="http://schemas.microsoft.com/office/powerpoint/2010/main" val="1036046533"/>
+      </p:ext>
+    </p:extLst>
+  </p:cSld>
+  <p:clrMapOvr>
+    <a:masterClrMapping/>
+  </p:clrMapOvr>
+</p:sld>
+</file>
+
+<file path=ppt/slides/slide16.xml><?xml version="1.0" encoding="utf-8"?>
+<p:sld xmlns:a="http://schemas.openxmlformats.org/drawingml/2006/main" xmlns:r="http://schemas.openxmlformats.org/officeDocument/2006/relationships" xmlns:p="http://schemas.openxmlformats.org/presentationml/2006/main">
+  <p:cSld>
+    <p:spTree>
+      <p:nvGrpSpPr>
+        <p:cNvPr id="1" name=""/>
+        <p:cNvGrpSpPr/>
+        <p:nvPr/>
+      </p:nvGrpSpPr>
+      <p:grpSpPr>
+        <a:xfrm>
+          <a:off x="0" y="0"/>
+          <a:ext cx="0" cy="0"/>
+          <a:chOff x="0" y="0"/>
+          <a:chExt cx="0" cy="0"/>
+        </a:xfrm>
+      </p:grpSpPr>
+      <p:sp>
+        <p:nvSpPr>
+          <p:cNvPr id="2" name="Title 1"/>
+          <p:cNvSpPr>
+            <a:spLocks noGrp="1"/>
+          </p:cNvSpPr>
+          <p:nvPr>
+            <p:ph type="title"/>
+          </p:nvPr>
+        </p:nvSpPr>
+        <p:spPr/>
+        <p:txBody>
+          <a:bodyPr/>
+          <a:lstStyle/>
+          <a:p>
+            <a:r>
+              <a:rPr lang="en-US" dirty="0" smtClean="0"/>
+              <a:t>Importing Text</a:t>
+            </a:r>
+            <a:endParaRPr lang="en-US" dirty="0"/>
+          </a:p>
+        </p:txBody>
+      </p:sp>
+      <p:sp>
+        <p:nvSpPr>
+          <p:cNvPr id="3" name="Content Placeholder 2"/>
+          <p:cNvSpPr>
+            <a:spLocks noGrp="1"/>
+          </p:cNvSpPr>
+          <p:nvPr>
+            <p:ph idx="1"/>
+          </p:nvPr>
+        </p:nvSpPr>
+        <p:spPr>
+          <a:xfrm>
+            <a:off x="1905000" y="1600200"/>
+            <a:ext cx="6781800" cy="4953000"/>
+          </a:xfrm>
+        </p:spPr>
+        <p:txBody>
+          <a:bodyPr>
+            <a:normAutofit fontScale="40000" lnSpcReduction="20000"/>
+          </a:bodyPr>
+          <a:lstStyle/>
+          <a:p>
+            <a:pPr marL="0" indent="0">
+              <a:buNone/>
+            </a:pPr>
+            <a:r>
+              <a:rPr lang="en-US" dirty="0" smtClean="0"/>
+              <a:t>Use </a:t>
+            </a:r>
+            <a:r>
+              <a:rPr lang="en-US" dirty="0" err="1" smtClean="0"/>
+              <a:t>read.table</a:t>
+            </a:r>
+            <a:r>
+              <a:rPr lang="en-US" dirty="0" smtClean="0"/>
+              <a:t>() and </a:t>
+            </a:r>
+            <a:r>
+              <a:rPr lang="en-US" dirty="0" err="1" smtClean="0"/>
+              <a:t>write.table</a:t>
+            </a:r>
+            <a:r>
+              <a:rPr lang="en-US" dirty="0" smtClean="0"/>
+              <a:t>()</a:t>
+            </a:r>
+          </a:p>
+          <a:p>
+            <a:r>
+              <a:rPr lang="en-US" dirty="0" smtClean="0"/>
+              <a:t>Other functions like read.csv ultimately call </a:t>
+            </a:r>
+            <a:r>
+              <a:rPr lang="en-US" dirty="0" err="1" smtClean="0"/>
+              <a:t>read.table</a:t>
+            </a:r>
+            <a:r>
+              <a:rPr lang="en-US" dirty="0" smtClean="0"/>
+              <a:t>, they’re meant to be convenient, but they’re not.</a:t>
+            </a:r>
+          </a:p>
+          <a:p>
+            <a:endParaRPr lang="en-US" dirty="0" smtClean="0"/>
+          </a:p>
+          <a:p>
+            <a:pPr marL="0" indent="0">
+              <a:buNone/>
+            </a:pPr>
+            <a:r>
+              <a:rPr lang="en-US" dirty="0" smtClean="0"/>
+              <a:t>The function arguments are important, so let’s talk about them:</a:t>
+            </a:r>
+          </a:p>
+          <a:p>
+            <a:pPr marL="0" indent="0">
+              <a:buNone/>
+            </a:pPr>
+            <a:r>
+              <a:rPr lang="en-US" dirty="0" err="1" smtClean="0"/>
+              <a:t>read.table</a:t>
+            </a:r>
+            <a:r>
+              <a:rPr lang="en-US" dirty="0"/>
+              <a:t>(</a:t>
+            </a:r>
+          </a:p>
+          <a:p>
+            <a:pPr lvl="1"/>
+            <a:r>
+              <a:rPr lang="en-US" dirty="0"/>
+              <a:t>file, </a:t>
+            </a:r>
+          </a:p>
+          <a:p>
+            <a:pPr lvl="1"/>
+            <a:r>
+              <a:rPr lang="en-US" dirty="0"/>
+              <a:t>header = FALSE, </a:t>
+            </a:r>
+          </a:p>
+          <a:p>
+            <a:pPr lvl="1"/>
+            <a:r>
+              <a:rPr lang="en-US" dirty="0" err="1"/>
+              <a:t>sep</a:t>
+            </a:r>
+            <a:r>
+              <a:rPr lang="en-US" dirty="0"/>
+              <a:t> = "", </a:t>
+            </a:r>
+          </a:p>
+          <a:p>
+            <a:pPr lvl="1"/>
+            <a:r>
+              <a:rPr lang="en-US" dirty="0"/>
+              <a:t>quote = "\"'",</a:t>
+            </a:r>
+          </a:p>
+          <a:p>
+            <a:pPr lvl="1"/>
+            <a:r>
+              <a:rPr lang="en-US" dirty="0" err="1"/>
+              <a:t>na.strings</a:t>
+            </a:r>
+            <a:r>
+              <a:rPr lang="en-US" dirty="0"/>
+              <a:t> = "NA", </a:t>
+            </a:r>
+          </a:p>
+          <a:p>
+            <a:pPr lvl="1"/>
+            <a:r>
+              <a:rPr lang="en-US" dirty="0" err="1"/>
+              <a:t>nrows</a:t>
+            </a:r>
+            <a:r>
+              <a:rPr lang="en-US" dirty="0"/>
+              <a:t> = -1,</a:t>
+            </a:r>
+          </a:p>
+          <a:p>
+            <a:pPr lvl="1"/>
+            <a:r>
+              <a:rPr lang="en-US" dirty="0"/>
+              <a:t>skip = 0, </a:t>
+            </a:r>
+          </a:p>
+          <a:p>
+            <a:pPr lvl="1"/>
+            <a:r>
+              <a:rPr lang="en-US" dirty="0" err="1"/>
+              <a:t>comment.char</a:t>
+            </a:r>
+            <a:r>
+              <a:rPr lang="en-US" dirty="0"/>
+              <a:t> = "#",</a:t>
+            </a:r>
+          </a:p>
+          <a:p>
+            <a:pPr lvl="1"/>
+            <a:r>
+              <a:rPr lang="en-US" dirty="0" err="1"/>
+              <a:t>stringsAsFactors</a:t>
+            </a:r>
+            <a:r>
+              <a:rPr lang="en-US" dirty="0"/>
+              <a:t> = TRUE,</a:t>
+            </a:r>
+          </a:p>
+          <a:p>
+            <a:pPr lvl="1"/>
+            <a:endParaRPr lang="en-US" dirty="0"/>
+          </a:p>
+          <a:p>
+            <a:pPr lvl="1"/>
+            <a:r>
+              <a:rPr lang="en-US" dirty="0"/>
+              <a:t>fill = !</a:t>
+            </a:r>
+            <a:r>
+              <a:rPr lang="en-US" dirty="0" err="1"/>
+              <a:t>blank.lines.skip</a:t>
+            </a:r>
+            <a:r>
+              <a:rPr lang="en-US" dirty="0"/>
+              <a:t>,</a:t>
+            </a:r>
+          </a:p>
+          <a:p>
+            <a:pPr lvl="1"/>
+            <a:r>
+              <a:rPr lang="en-US" dirty="0" err="1"/>
+              <a:t>strip.white</a:t>
+            </a:r>
+            <a:r>
+              <a:rPr lang="en-US" dirty="0"/>
+              <a:t> = FALSE, </a:t>
+            </a:r>
+          </a:p>
+          <a:p>
+            <a:pPr lvl="1"/>
+            <a:r>
+              <a:rPr lang="en-US" dirty="0" err="1"/>
+              <a:t>blank.lines.skip</a:t>
+            </a:r>
+            <a:r>
+              <a:rPr lang="en-US" dirty="0"/>
+              <a:t> = TRUE,</a:t>
+            </a:r>
+          </a:p>
+          <a:p>
+            <a:pPr lvl="1"/>
+            <a:r>
+              <a:rPr lang="en-US" dirty="0" err="1"/>
+              <a:t>allowEscapes</a:t>
+            </a:r>
+            <a:r>
+              <a:rPr lang="en-US" dirty="0"/>
+              <a:t> = FALSE, </a:t>
+            </a:r>
+          </a:p>
+          <a:p>
+            <a:pPr lvl="1"/>
+            <a:r>
+              <a:rPr lang="en-US" dirty="0"/>
+              <a:t>flush = FALSE,</a:t>
+            </a:r>
+          </a:p>
+          <a:p>
+            <a:pPr lvl="1"/>
+            <a:endParaRPr lang="en-US" dirty="0"/>
+          </a:p>
+          <a:p>
+            <a:pPr lvl="1"/>
+            <a:r>
+              <a:rPr lang="en-US" dirty="0" err="1"/>
+              <a:t>fileEncoding</a:t>
+            </a:r>
+            <a:r>
+              <a:rPr lang="en-US" dirty="0"/>
+              <a:t> = "", </a:t>
+            </a:r>
+          </a:p>
+          <a:p>
+            <a:pPr lvl="1"/>
+            <a:r>
+              <a:rPr lang="en-US" dirty="0"/>
+              <a:t>encoding = "unknown", </a:t>
+            </a:r>
+          </a:p>
+          <a:p>
+            <a:pPr lvl="1"/>
+            <a:r>
+              <a:rPr lang="en-US" dirty="0"/>
+              <a:t>text, </a:t>
+            </a:r>
+          </a:p>
+          <a:p>
+            <a:pPr lvl="1"/>
+            <a:r>
+              <a:rPr lang="en-US" dirty="0" err="1"/>
+              <a:t>skipNul</a:t>
+            </a:r>
+            <a:r>
+              <a:rPr lang="en-US" dirty="0"/>
+              <a:t> = FALSE</a:t>
+            </a:r>
+          </a:p>
+        </p:txBody>
+      </p:sp>
+    </p:spTree>
+    <p:extLst>
+      <p:ext uri="{BB962C8B-B14F-4D97-AF65-F5344CB8AC3E}">
+        <p14:creationId xmlns:p14="http://schemas.microsoft.com/office/powerpoint/2010/main" val="2306977760"/>
+      </p:ext>
+    </p:extLst>
+  </p:cSld>
+  <p:clrMapOvr>
+    <a:masterClrMapping/>
+  </p:clrMapOvr>
+</p:sld>
+</file>
+
+<file path=ppt/slides/slide17.xml><?xml version="1.0" encoding="utf-8"?>
+<p:sld xmlns:a="http://schemas.openxmlformats.org/drawingml/2006/main" xmlns:r="http://schemas.openxmlformats.org/officeDocument/2006/relationships" xmlns:p="http://schemas.openxmlformats.org/presentationml/2006/main">
+  <p:cSld>
+    <p:spTree>
+      <p:nvGrpSpPr>
+        <p:cNvPr id="1" name=""/>
+        <p:cNvGrpSpPr/>
+        <p:nvPr/>
+      </p:nvGrpSpPr>
+      <p:grpSpPr>
+        <a:xfrm>
+          <a:off x="0" y="0"/>
+          <a:ext cx="0" cy="0"/>
+          <a:chOff x="0" y="0"/>
+          <a:chExt cx="0" cy="0"/>
+        </a:xfrm>
+      </p:grpSpPr>
+      <p:sp>
+        <p:nvSpPr>
+          <p:cNvPr id="2" name="Title 1"/>
+          <p:cNvSpPr>
+            <a:spLocks noGrp="1"/>
+          </p:cNvSpPr>
+          <p:nvPr>
+            <p:ph type="title"/>
+          </p:nvPr>
+        </p:nvSpPr>
+        <p:spPr/>
+        <p:txBody>
+          <a:bodyPr/>
+          <a:lstStyle/>
+          <a:p>
+            <a:r>
+              <a:rPr lang="en-US" smtClean="0"/>
+              <a:t>Regular Expressions</a:t>
+            </a:r>
+            <a:endParaRPr lang="en-US" dirty="0"/>
+          </a:p>
+        </p:txBody>
+      </p:sp>
+      <p:pic>
+        <p:nvPicPr>
+          <p:cNvPr id="1026" name="Picture 2"/>
+          <p:cNvPicPr>
+            <a:picLocks noGrp="1" noChangeAspect="1" noChangeArrowheads="1"/>
+          </p:cNvPicPr>
+          <p:nvPr>
+            <p:ph idx="1"/>
+          </p:nvPr>
+        </p:nvPicPr>
+        <p:blipFill>
+          <a:blip r:embed="rId2">
+            <a:extLst>
+              <a:ext uri="{28A0092B-C50C-407E-A947-70E740481C1C}">
+                <a14:useLocalDpi xmlns:a14="http://schemas.microsoft.com/office/drawing/2010/main" val="0"/>
+              </a:ext>
+            </a:extLst>
+          </a:blip>
+          <a:srcRect/>
+          <a:stretch>
+            <a:fillRect/>
+          </a:stretch>
+        </p:blipFill>
+        <p:spPr bwMode="auto">
+          <a:xfrm>
+            <a:off x="1905000" y="2044598"/>
+            <a:ext cx="6781800" cy="3637166"/>
+          </a:xfrm>
+          <a:prstGeom prst="rect">
+            <a:avLst/>
+          </a:prstGeom>
+          <a:noFill/>
+          <a:ln>
+            <a:noFill/>
+          </a:ln>
+          <a:extLst>
+            <a:ext uri="{909E8E84-426E-40DD-AFC4-6F175D3DCCD1}">
+              <a14:hiddenFill xmlns:a14="http://schemas.microsoft.com/office/drawing/2010/main">
+                <a:solidFill>
+                  <a:schemeClr val="accent1"/>
+                </a:solidFill>
+              </a14:hiddenFill>
+            </a:ext>
+            <a:ext uri="{91240B29-F687-4F45-9708-019B960494DF}">
+              <a14:hiddenLine xmlns:a14="http://schemas.microsoft.com/office/drawing/2010/main" w="9525">
+                <a:solidFill>
+                  <a:schemeClr val="tx1"/>
+                </a:solidFill>
+                <a:miter lim="800000"/>
+                <a:headEnd/>
+                <a:tailEnd/>
+              </a14:hiddenLine>
+            </a:ext>
+          </a:extLst>
+        </p:spPr>
+      </p:pic>
+    </p:spTree>
+    <p:extLst>
+      <p:ext uri="{BB962C8B-B14F-4D97-AF65-F5344CB8AC3E}">
+        <p14:creationId xmlns:p14="http://schemas.microsoft.com/office/powerpoint/2010/main" val="2229497453"/>
+      </p:ext>
+    </p:extLst>
+  </p:cSld>
+  <p:clrMapOvr>
+    <a:masterClrMapping/>
+  </p:clrMapOvr>
+</p:sld>
+</file>
+
 <file path=ppt/slides/slide2.xml><?xml version="1.0" encoding="utf-8"?>
 <p:sld xmlns:a="http://schemas.openxmlformats.org/drawingml/2006/main" xmlns:r="http://schemas.openxmlformats.org/officeDocument/2006/relationships" xmlns:p="http://schemas.openxmlformats.org/presentationml/2006/main">
   <p:cSld>
@@ -3912,6 +5984,96 @@
             <p:ph type="title"/>
           </p:nvPr>
         </p:nvSpPr>
+        <p:spPr/>
+        <p:txBody>
+          <a:bodyPr/>
+          <a:lstStyle/>
+          <a:p>
+            <a:r>
+              <a:rPr lang="en-US" dirty="0" smtClean="0"/>
+              <a:t>Questions?</a:t>
+            </a:r>
+            <a:endParaRPr lang="en-US" dirty="0"/>
+          </a:p>
+        </p:txBody>
+      </p:sp>
+      <p:sp>
+        <p:nvSpPr>
+          <p:cNvPr id="3" name="Content Placeholder 2"/>
+          <p:cNvSpPr>
+            <a:spLocks noGrp="1"/>
+          </p:cNvSpPr>
+          <p:nvPr>
+            <p:ph idx="1"/>
+          </p:nvPr>
+        </p:nvSpPr>
+        <p:spPr/>
+        <p:txBody>
+          <a:bodyPr/>
+          <a:lstStyle/>
+          <a:p>
+            <a:r>
+              <a:rPr lang="en-US" dirty="0" smtClean="0"/>
+              <a:t>Technical problems?</a:t>
+            </a:r>
+          </a:p>
+          <a:p>
+            <a:r>
+              <a:rPr lang="en-US" dirty="0" smtClean="0"/>
+              <a:t>Homework?</a:t>
+            </a:r>
+          </a:p>
+          <a:p>
+            <a:r>
+              <a:rPr lang="en-US" dirty="0" smtClean="0"/>
+              <a:t>Questions from last class?</a:t>
+            </a:r>
+          </a:p>
+          <a:p>
+            <a:endParaRPr lang="en-US" dirty="0"/>
+          </a:p>
+        </p:txBody>
+      </p:sp>
+    </p:spTree>
+    <p:extLst>
+      <p:ext uri="{BB962C8B-B14F-4D97-AF65-F5344CB8AC3E}">
+        <p14:creationId xmlns:p14="http://schemas.microsoft.com/office/powerpoint/2010/main" val="3254240096"/>
+      </p:ext>
+    </p:extLst>
+  </p:cSld>
+  <p:clrMapOvr>
+    <a:masterClrMapping/>
+  </p:clrMapOvr>
+</p:sld>
+</file>
+
+<file path=ppt/slides/slide3.xml><?xml version="1.0" encoding="utf-8"?>
+<p:sld xmlns:a="http://schemas.openxmlformats.org/drawingml/2006/main" xmlns:r="http://schemas.openxmlformats.org/officeDocument/2006/relationships" xmlns:p="http://schemas.openxmlformats.org/presentationml/2006/main">
+  <p:cSld>
+    <p:spTree>
+      <p:nvGrpSpPr>
+        <p:cNvPr id="1" name=""/>
+        <p:cNvGrpSpPr/>
+        <p:nvPr/>
+      </p:nvGrpSpPr>
+      <p:grpSpPr>
+        <a:xfrm>
+          <a:off x="0" y="0"/>
+          <a:ext cx="0" cy="0"/>
+          <a:chOff x="0" y="0"/>
+          <a:chExt cx="0" cy="0"/>
+        </a:xfrm>
+      </p:grpSpPr>
+      <p:sp>
+        <p:nvSpPr>
+          <p:cNvPr id="2" name="Title 1"/>
+          <p:cNvSpPr>
+            <a:spLocks noGrp="1"/>
+          </p:cNvSpPr>
+          <p:nvPr>
+            <p:ph type="title"/>
+          </p:nvPr>
+        </p:nvSpPr>
         <p:spPr>
           <a:xfrm>
             <a:off x="1600200" y="152400"/>
@@ -3924,7 +6086,7 @@
           <a:p>
             <a:r>
               <a:rPr lang="en-US" dirty="0" smtClean="0"/>
-              <a:t>Summary Points</a:t>
+              <a:t>Review: Git</a:t>
             </a:r>
             <a:endParaRPr lang="en-US" dirty="0"/>
           </a:p>
@@ -3943,91 +6105,98 @@
         <p:spPr>
           <a:xfrm>
             <a:off x="1600200" y="1295400"/>
-            <a:ext cx="7086600" cy="5181600"/>
+            <a:ext cx="4572000" cy="5162550"/>
           </a:xfrm>
         </p:spPr>
         <p:txBody>
           <a:bodyPr>
-            <a:normAutofit fontScale="92500" lnSpcReduction="20000"/>
+            <a:normAutofit lnSpcReduction="10000"/>
           </a:bodyPr>
           <a:lstStyle/>
           <a:p>
             <a:r>
               <a:rPr lang="en-US" dirty="0" smtClean="0"/>
-              <a:t>Why learn R</a:t>
-            </a:r>
-          </a:p>
-          <a:p>
-            <a:pPr lvl="1"/>
-            <a:r>
-              <a:rPr lang="en-US" dirty="0" smtClean="0"/>
-              <a:t>Community</a:t>
-            </a:r>
-          </a:p>
-          <a:p>
-            <a:pPr lvl="1"/>
-            <a:r>
-              <a:rPr lang="en-US" dirty="0" smtClean="0"/>
-              <a:t>Top choice among data scientists (along with Python)</a:t>
-            </a:r>
-          </a:p>
-          <a:p>
-            <a:pPr lvl="1"/>
-            <a:r>
-              <a:rPr lang="en-US" dirty="0" smtClean="0"/>
-              <a:t>Good balance of functionality / ease of use</a:t>
-            </a:r>
-          </a:p>
-          <a:p>
-            <a:r>
-              <a:rPr lang="en-US" dirty="0" smtClean="0"/>
-              <a:t>Why learn data.table</a:t>
-            </a:r>
-          </a:p>
-          <a:p>
-            <a:pPr lvl="1"/>
-            <a:r>
-              <a:rPr lang="en-US" dirty="0" smtClean="0"/>
-              <a:t>Quick access to variables</a:t>
-            </a:r>
-          </a:p>
-          <a:p>
-            <a:pPr lvl="1"/>
-            <a:r>
-              <a:rPr lang="en-US" dirty="0" smtClean="0"/>
-              <a:t>Merging</a:t>
-            </a:r>
-          </a:p>
-          <a:p>
-            <a:pPr lvl="1"/>
-            <a:r>
-              <a:rPr lang="en-US" dirty="0" smtClean="0"/>
-              <a:t>Integer based dates (</a:t>
-            </a:r>
-            <a:r>
-              <a:rPr lang="en-US" dirty="0" err="1" smtClean="0"/>
-              <a:t>IDates</a:t>
-            </a:r>
-            <a:r>
-              <a:rPr lang="en-US" dirty="0" smtClean="0"/>
-              <a:t>) will make your life 100% simpler</a:t>
-            </a:r>
-          </a:p>
-          <a:p>
-            <a:r>
-              <a:rPr lang="en-US" dirty="0" smtClean="0"/>
-              <a:t>Version control is essential in all projects</a:t>
-            </a:r>
-          </a:p>
-          <a:p>
-            <a:pPr lvl="1"/>
-            <a:r>
-              <a:rPr lang="en-US" dirty="0" smtClean="0"/>
-              <a:t>Reproducibility</a:t>
-            </a:r>
-          </a:p>
-        </p:txBody>
-      </p:sp>
+              <a:t>Git is worth reviewing because it’s so important as a tool for version control</a:t>
+            </a:r>
+          </a:p>
+          <a:p>
+            <a:endParaRPr lang="en-US" dirty="0" smtClean="0"/>
+          </a:p>
+          <a:p>
+            <a:r>
+              <a:rPr lang="en-US" dirty="0" smtClean="0"/>
+              <a:t>This is what an example git workflow looks like:</a:t>
+            </a:r>
+          </a:p>
+          <a:p>
+            <a:endParaRPr lang="en-US" dirty="0" smtClean="0"/>
+          </a:p>
+          <a:p>
+            <a:pPr marL="0" indent="0">
+              <a:buNone/>
+            </a:pPr>
+            <a:r>
+              <a:rPr lang="en-US" sz="1400" dirty="0"/>
+              <a:t>http://en.wikipedia.org/wiki/File:Revision_controlled_project_visualization-2010-24-02.svg</a:t>
+            </a:r>
+            <a:endParaRPr lang="en-US" dirty="0" smtClean="0"/>
+          </a:p>
+        </p:txBody>
+      </p:sp>
+      <p:pic>
+        <p:nvPicPr>
+          <p:cNvPr id="1026" name="Picture 2"/>
+          <p:cNvPicPr>
+            <a:picLocks noChangeAspect="1" noChangeArrowheads="1"/>
+          </p:cNvPicPr>
+          <p:nvPr/>
+        </p:nvPicPr>
+        <p:blipFill>
+          <a:blip r:embed="rId3">
+            <a:extLst>
+              <a:ext uri="{28A0092B-C50C-407E-A947-70E740481C1C}">
+                <a14:useLocalDpi xmlns:a14="http://schemas.microsoft.com/office/drawing/2010/main" val="0"/>
+              </a:ext>
+            </a:extLst>
+          </a:blip>
+          <a:srcRect/>
+          <a:stretch>
+            <a:fillRect/>
+          </a:stretch>
+        </p:blipFill>
+        <p:spPr bwMode="auto">
+          <a:xfrm>
+            <a:off x="6553200" y="1295400"/>
+            <a:ext cx="2047875" cy="5162550"/>
+          </a:xfrm>
+          <a:prstGeom prst="rect">
+            <a:avLst/>
+          </a:prstGeom>
+          <a:noFill/>
+          <a:ln>
+            <a:noFill/>
+          </a:ln>
+          <a:extLst>
+            <a:ext uri="{909E8E84-426E-40DD-AFC4-6F175D3DCCD1}">
+              <a14:hiddenFill xmlns:a14="http://schemas.microsoft.com/office/drawing/2010/main">
+                <a:solidFill>
+                  <a:schemeClr val="accent1"/>
+                </a:solidFill>
+              </a14:hiddenFill>
+            </a:ext>
+            <a:ext uri="{91240B29-F687-4F45-9708-019B960494DF}">
+              <a14:hiddenLine xmlns:a14="http://schemas.microsoft.com/office/drawing/2010/main" w="9525">
+                <a:solidFill>
+                  <a:schemeClr val="tx1"/>
+                </a:solidFill>
+                <a:miter lim="800000"/>
+                <a:headEnd/>
+                <a:tailEnd/>
+              </a14:hiddenLine>
+            </a:ext>
+          </a:extLst>
+        </p:spPr>
+      </p:pic>
     </p:spTree>
     <p:extLst>
       <p:ext uri="{BB962C8B-B14F-4D97-AF65-F5344CB8AC3E}">
@@ -4048,191 +6217,6 @@
 </p:sld>
 </file>
 
-<file path=ppt/slides/slide3.xml><?xml version="1.0" encoding="utf-8"?>
-<p:sld xmlns:a="http://schemas.openxmlformats.org/drawingml/2006/main" xmlns:r="http://schemas.openxmlformats.org/officeDocument/2006/relationships" xmlns:p="http://schemas.openxmlformats.org/presentationml/2006/main">
-  <p:cSld>
-    <p:spTree>
-      <p:nvGrpSpPr>
-        <p:cNvPr id="1" name=""/>
-        <p:cNvGrpSpPr/>
-        <p:nvPr/>
-      </p:nvGrpSpPr>
-      <p:grpSpPr>
-        <a:xfrm>
-          <a:off x="0" y="0"/>
-          <a:ext cx="0" cy="0"/>
-          <a:chOff x="0" y="0"/>
-          <a:chExt cx="0" cy="0"/>
-        </a:xfrm>
-      </p:grpSpPr>
-      <p:sp>
-        <p:nvSpPr>
-          <p:cNvPr id="2" name="Title 1"/>
-          <p:cNvSpPr>
-            <a:spLocks noGrp="1"/>
-          </p:cNvSpPr>
-          <p:nvPr>
-            <p:ph type="title"/>
-          </p:nvPr>
-        </p:nvSpPr>
-        <p:spPr/>
-        <p:txBody>
-          <a:bodyPr>
-            <a:normAutofit fontScale="90000"/>
-          </a:bodyPr>
-          <a:lstStyle/>
-          <a:p>
-            <a:r>
-              <a:rPr lang="en-US" dirty="0" smtClean="0"/>
-              <a:t>Data analysis and basic exploration</a:t>
-            </a:r>
-            <a:endParaRPr lang="en-US" dirty="0"/>
-          </a:p>
-        </p:txBody>
-      </p:sp>
-      <p:sp>
-        <p:nvSpPr>
-          <p:cNvPr id="3" name="Content Placeholder 2"/>
-          <p:cNvSpPr>
-            <a:spLocks noGrp="1"/>
-          </p:cNvSpPr>
-          <p:nvPr>
-            <p:ph idx="1"/>
-          </p:nvPr>
-        </p:nvSpPr>
-        <p:spPr/>
-        <p:txBody>
-          <a:bodyPr>
-            <a:normAutofit fontScale="70000" lnSpcReduction="20000"/>
-          </a:bodyPr>
-          <a:lstStyle/>
-          <a:p>
-            <a:r>
-              <a:rPr lang="en-US" dirty="0" smtClean="0"/>
-              <a:t>Data exploration is often the most important and insightful part of the project.  </a:t>
-            </a:r>
-          </a:p>
-          <a:p>
-            <a:pPr lvl="1"/>
-            <a:r>
-              <a:rPr lang="en-US" dirty="0" smtClean="0"/>
-              <a:t>In fact, most projects stop here because just looking at the data is enough to make the right decisions</a:t>
-            </a:r>
-          </a:p>
-          <a:p>
-            <a:endParaRPr lang="en-US" dirty="0"/>
-          </a:p>
-          <a:p>
-            <a:r>
-              <a:rPr lang="en-US" dirty="0" smtClean="0"/>
-              <a:t>Update project using </a:t>
-            </a:r>
-            <a:r>
-              <a:rPr lang="en-US" dirty="0" err="1" smtClean="0"/>
-              <a:t>git</a:t>
-            </a:r>
-            <a:r>
-              <a:rPr lang="en-US" dirty="0" smtClean="0"/>
-              <a:t> pull</a:t>
-            </a:r>
-          </a:p>
-          <a:p>
-            <a:pPr lvl="1"/>
-            <a:r>
-              <a:rPr lang="en-US" dirty="0" smtClean="0">
-                <a:hlinkClick r:id="rId2"/>
-              </a:rPr>
-              <a:t>https</a:t>
-            </a:r>
-            <a:r>
-              <a:rPr lang="en-US" dirty="0">
-                <a:hlinkClick r:id="rId2"/>
-              </a:rPr>
-              <a:t>://</a:t>
-            </a:r>
-            <a:r>
-              <a:rPr lang="en-US" dirty="0" smtClean="0">
-                <a:hlinkClick r:id="rId2"/>
-              </a:rPr>
-              <a:t>github.com/geneorama/DataScienceForBusiness</a:t>
-            </a:r>
-            <a:endParaRPr lang="en-US" dirty="0" smtClean="0"/>
-          </a:p>
-          <a:p>
-            <a:r>
-              <a:rPr lang="en-US" dirty="0" smtClean="0"/>
-              <a:t>Open Lecture 3 </a:t>
-            </a:r>
-            <a:r>
-              <a:rPr lang="en-US" dirty="0" err="1" smtClean="0"/>
-              <a:t>ggplot</a:t>
-            </a:r>
-            <a:r>
-              <a:rPr lang="en-US" dirty="0" smtClean="0"/>
-              <a:t> example</a:t>
-            </a:r>
-          </a:p>
-          <a:p>
-            <a:pPr lvl="1"/>
-            <a:r>
-              <a:rPr lang="en-US" dirty="0" smtClean="0"/>
-              <a:t>We’re going to clean this up and extend this report</a:t>
-            </a:r>
-          </a:p>
-          <a:p>
-            <a:pPr lvl="1"/>
-            <a:r>
-              <a:rPr lang="en-US" dirty="0" smtClean="0"/>
-              <a:t>Remember, </a:t>
-            </a:r>
-            <a:r>
-              <a:rPr lang="en-US" dirty="0" err="1" smtClean="0"/>
-              <a:t>knitr</a:t>
-            </a:r>
-            <a:r>
-              <a:rPr lang="en-US" dirty="0" smtClean="0"/>
-              <a:t> uses markdown</a:t>
-            </a:r>
-          </a:p>
-          <a:p>
-            <a:pPr lvl="2"/>
-            <a:r>
-              <a:rPr lang="en-US" sz="2000" dirty="0">
-                <a:hlinkClick r:id="rId3"/>
-              </a:rPr>
-              <a:t>http://</a:t>
-            </a:r>
-            <a:r>
-              <a:rPr lang="en-US" sz="2000" dirty="0" smtClean="0">
-                <a:hlinkClick r:id="rId3"/>
-              </a:rPr>
-              <a:t>cran.r-project.org/web/packages/knitr/vignettes/knitr-refcard.pdf</a:t>
-            </a:r>
-            <a:endParaRPr lang="en-US" sz="2000" dirty="0" smtClean="0"/>
-          </a:p>
-          <a:p>
-            <a:pPr lvl="2"/>
-            <a:endParaRPr lang="en-US" dirty="0" smtClean="0"/>
-          </a:p>
-          <a:p>
-            <a:pPr lvl="2"/>
-            <a:endParaRPr lang="en-US" dirty="0"/>
-          </a:p>
-        </p:txBody>
-      </p:sp>
-    </p:spTree>
-    <p:extLst>
-      <p:ext uri="{BB962C8B-B14F-4D97-AF65-F5344CB8AC3E}">
-        <p14:creationId xmlns:p14="http://schemas.microsoft.com/office/powerpoint/2010/main" val="74311564"/>
-      </p:ext>
-    </p:extLst>
-  </p:cSld>
-  <p:clrMapOvr>
-    <a:masterClrMapping/>
-  </p:clrMapOvr>
-</p:sld>
-</file>
-
 <file path=ppt/slides/slide4.xml><?xml version="1.0" encoding="utf-8"?>
 <p:sld xmlns:a="http://schemas.openxmlformats.org/drawingml/2006/main" xmlns:r="http://schemas.openxmlformats.org/officeDocument/2006/relationships" xmlns:p="http://schemas.openxmlformats.org/presentationml/2006/main">
   <p:cSld>
@@ -4262,140 +6246,137 @@
         </p:nvSpPr>
         <p:spPr/>
         <p:txBody>
-          <a:bodyPr/>
-          <a:lstStyle/>
-          <a:p>
-            <a:r>
-              <a:rPr lang="en-US" dirty="0" smtClean="0"/>
-              <a:t>Remote connections</a:t>
-            </a:r>
-            <a:endParaRPr lang="en-US" dirty="0"/>
-          </a:p>
-        </p:txBody>
-      </p:sp>
-      <p:sp>
-        <p:nvSpPr>
-          <p:cNvPr id="3" name="Content Placeholder 2"/>
-          <p:cNvSpPr>
-            <a:spLocks noGrp="1"/>
-          </p:cNvSpPr>
-          <p:nvPr>
-            <p:ph idx="1"/>
-          </p:nvPr>
-        </p:nvSpPr>
-        <p:spPr/>
-        <p:txBody>
           <a:bodyPr>
-            <a:normAutofit fontScale="70000" lnSpcReduction="20000"/>
+            <a:normAutofit fontScale="90000"/>
           </a:bodyPr>
           <a:lstStyle/>
           <a:p>
             <a:r>
               <a:rPr lang="en-US" dirty="0" smtClean="0"/>
-              <a:t>You will often need to remote into other computers to </a:t>
+              <a:t>Your IDE – R Studio</a:t>
+            </a:r>
+            <a:br>
+              <a:rPr lang="en-US" dirty="0" smtClean="0"/>
+            </a:br>
+            <a:r>
+              <a:rPr lang="en-US" sz="2700" dirty="0" smtClean="0"/>
+              <a:t>(Quick reminders)</a:t>
+            </a:r>
+            <a:endParaRPr lang="en-US" sz="2700" dirty="0"/>
+          </a:p>
+        </p:txBody>
+      </p:sp>
+      <p:sp>
+        <p:nvSpPr>
+          <p:cNvPr id="3" name="Content Placeholder 2"/>
+          <p:cNvSpPr>
+            <a:spLocks noGrp="1"/>
+          </p:cNvSpPr>
+          <p:nvPr>
+            <p:ph idx="1"/>
+          </p:nvPr>
+        </p:nvSpPr>
+        <p:spPr/>
+        <p:txBody>
+          <a:bodyPr>
+            <a:normAutofit fontScale="77500" lnSpcReduction="20000"/>
+          </a:bodyPr>
+          <a:lstStyle/>
+          <a:p>
+            <a:r>
+              <a:rPr lang="en-US" dirty="0" smtClean="0"/>
+              <a:t>Project </a:t>
+            </a:r>
+            <a:r>
+              <a:rPr lang="en-US" dirty="0"/>
+              <a:t>management is upper right corner… make sure whether you’re in a project</a:t>
             </a:r>
           </a:p>
           <a:p>
             <a:pPr lvl="1"/>
             <a:r>
-              <a:rPr lang="en-US" dirty="0" smtClean="0"/>
-              <a:t>Check information, </a:t>
+              <a:rPr lang="en-US" dirty="0"/>
+              <a:t>Keeps track of your working directory</a:t>
             </a:r>
           </a:p>
           <a:p>
             <a:pPr lvl="1"/>
             <a:r>
-              <a:rPr lang="en-US" dirty="0" smtClean="0"/>
-              <a:t>Start a process</a:t>
+              <a:rPr lang="en-US" dirty="0"/>
+              <a:t>Allows for relative paths</a:t>
+            </a:r>
+          </a:p>
+          <a:p>
+            <a:pPr marL="914400" lvl="2" indent="0">
+              <a:buNone/>
+            </a:pPr>
+            <a:r>
+              <a:rPr lang="en-US" dirty="0"/>
+              <a:t>./data/</a:t>
+            </a:r>
+            <a:r>
+              <a:rPr lang="en-US" dirty="0" err="1"/>
+              <a:t>somefile.Rds</a:t>
+            </a:r>
+            <a:endParaRPr lang="en-US" dirty="0"/>
+          </a:p>
+          <a:p>
+            <a:pPr marL="914400" lvl="2" indent="0">
+              <a:buNone/>
+            </a:pPr>
+            <a:r>
+              <a:rPr lang="en-US" dirty="0"/>
+              <a:t>./images/</a:t>
+            </a:r>
+            <a:r>
+              <a:rPr lang="en-US" dirty="0" err="1"/>
+              <a:t>somegraph.Rds</a:t>
+            </a:r>
+            <a:endParaRPr lang="en-US" dirty="0"/>
+          </a:p>
+          <a:p>
+            <a:r>
+              <a:rPr lang="en-US" dirty="0" smtClean="0"/>
+              <a:t>Set global options</a:t>
             </a:r>
           </a:p>
           <a:p>
             <a:pPr lvl="1"/>
             <a:r>
               <a:rPr lang="en-US" dirty="0" smtClean="0"/>
-              <a:t>Do basic admin (like reboot)</a:t>
+              <a:t>Don’t save workspace</a:t>
             </a:r>
           </a:p>
           <a:p>
             <a:pPr lvl="1"/>
             <a:r>
               <a:rPr lang="en-US" dirty="0" smtClean="0"/>
-              <a:t>Transfer data</a:t>
+              <a:t>Turn on line numbers</a:t>
             </a:r>
           </a:p>
           <a:p>
             <a:pPr lvl="1"/>
             <a:r>
               <a:rPr lang="en-US" dirty="0" smtClean="0"/>
-              <a:t>Perform queries</a:t>
+              <a:t>Use “margin” guide</a:t>
+            </a:r>
+          </a:p>
+          <a:p>
+            <a:r>
+              <a:rPr lang="en-US" dirty="0" smtClean="0"/>
+              <a:t>You can perform many git functions from within R Studio, including file diffs</a:t>
             </a:r>
           </a:p>
           <a:p>
             <a:pPr lvl="1"/>
-            <a:r>
-              <a:rPr lang="en-US" dirty="0" smtClean="0"/>
-              <a:t>Gain access</a:t>
-            </a:r>
-          </a:p>
-          <a:p>
-            <a:endParaRPr lang="en-US" dirty="0"/>
-          </a:p>
-          <a:p>
-            <a:r>
-              <a:rPr lang="en-US" dirty="0" smtClean="0"/>
-              <a:t>Remote in to this computer… and tell me what’s in the file “important_document.txt”</a:t>
-            </a:r>
-          </a:p>
-          <a:p>
-            <a:pPr lvl="1"/>
-            <a:r>
-              <a:rPr lang="en-US" dirty="0" smtClean="0"/>
-              <a:t>Use these commands: </a:t>
-            </a:r>
-            <a:r>
-              <a:rPr lang="en-US" dirty="0" err="1" smtClean="0"/>
-              <a:t>ssh</a:t>
-            </a:r>
-            <a:r>
-              <a:rPr lang="en-US" dirty="0" smtClean="0"/>
-              <a:t>, </a:t>
-            </a:r>
-            <a:r>
-              <a:rPr lang="en-US" dirty="0" err="1" smtClean="0"/>
-              <a:t>ls</a:t>
-            </a:r>
-            <a:r>
-              <a:rPr lang="en-US" dirty="0" smtClean="0"/>
-              <a:t>, cat</a:t>
-            </a:r>
-          </a:p>
-          <a:p>
             <a:endParaRPr lang="en-US" dirty="0" smtClean="0"/>
-          </a:p>
-          <a:p>
-            <a:r>
-              <a:rPr lang="en-US" dirty="0" smtClean="0"/>
-              <a:t>Username: </a:t>
-            </a:r>
-            <a:r>
-              <a:rPr lang="en-US" dirty="0" err="1" smtClean="0"/>
-              <a:t>depaulpeeps</a:t>
-            </a:r>
-            <a:endParaRPr lang="en-US" dirty="0" smtClean="0"/>
-          </a:p>
-          <a:p>
-            <a:r>
-              <a:rPr lang="en-US" dirty="0" smtClean="0"/>
-              <a:t>Password: G1thubFOSS4ever</a:t>
-            </a:r>
-            <a:endParaRPr lang="en-US" dirty="0"/>
           </a:p>
         </p:txBody>
       </p:sp>
     </p:spTree>
     <p:extLst>
       <p:ext uri="{BB962C8B-B14F-4D97-AF65-F5344CB8AC3E}">
-        <p14:creationId xmlns:p14="http://schemas.microsoft.com/office/powerpoint/2010/main" val="3073290066"/>
+        <p14:creationId xmlns:p14="http://schemas.microsoft.com/office/powerpoint/2010/main" val="2822189813"/>
       </p:ext>
     </p:extLst>
   </p:cSld>
@@ -4424,71 +6405,251 @@
       </p:grpSpPr>
       <p:sp>
         <p:nvSpPr>
-          <p:cNvPr id="2" name="Title 1"/>
-          <p:cNvSpPr>
-            <a:spLocks noGrp="1"/>
-          </p:cNvSpPr>
-          <p:nvPr>
-            <p:ph type="title"/>
-          </p:nvPr>
-        </p:nvSpPr>
-        <p:spPr/>
-        <p:txBody>
-          <a:bodyPr>
-            <a:normAutofit fontScale="90000"/>
-          </a:bodyPr>
-          <a:lstStyle/>
-          <a:p>
-            <a:r>
-              <a:rPr lang="en-US" dirty="0" smtClean="0"/>
-              <a:t>Remote Connections</a:t>
-            </a:r>
-            <a:br>
-              <a:rPr lang="en-US" dirty="0" smtClean="0"/>
-            </a:br>
-            <a:r>
-              <a:rPr lang="en-US" dirty="0" smtClean="0"/>
-              <a:t>Fun and useful</a:t>
-            </a:r>
-            <a:endParaRPr lang="en-US" dirty="0"/>
-          </a:p>
-        </p:txBody>
-      </p:sp>
-      <p:sp>
-        <p:nvSpPr>
-          <p:cNvPr id="3" name="Content Placeholder 2"/>
-          <p:cNvSpPr>
-            <a:spLocks noGrp="1"/>
-          </p:cNvSpPr>
-          <p:nvPr>
-            <p:ph idx="1"/>
-          </p:nvPr>
+          <p:cNvPr id="2" name="Content Placeholder 2"/>
+          <p:cNvSpPr txBox="1">
+            <a:spLocks/>
+          </p:cNvSpPr>
+          <p:nvPr/>
         </p:nvSpPr>
         <p:spPr>
           <a:xfrm>
-            <a:off x="1676400" y="1767840"/>
-            <a:ext cx="7010400" cy="990600"/>
+            <a:off x="152400" y="1570037"/>
+            <a:ext cx="3581400" cy="4525963"/>
           </a:xfrm>
+          <a:prstGeom prst="rect">
+            <a:avLst/>
+          </a:prstGeom>
         </p:spPr>
         <p:txBody>
           <a:bodyPr>
-            <a:normAutofit fontScale="70000" lnSpcReduction="20000"/>
+            <a:normAutofit fontScale="62500" lnSpcReduction="20000"/>
           </a:bodyPr>
-          <a:lstStyle/>
-          <a:p>
-            <a:r>
-              <a:rPr lang="en-US" dirty="0" smtClean="0"/>
-              <a:t>The Raspberry Pi is another great reason to be able to handle / use remote </a:t>
-            </a:r>
-            <a:r>
-              <a:rPr lang="en-US" dirty="0" smtClean="0"/>
-              <a:t>connections</a:t>
-            </a:r>
-          </a:p>
-          <a:p>
-            <a:r>
-              <a:rPr lang="en-US" dirty="0" smtClean="0"/>
-              <a:t>It’s also a great way to learn basic Linux server admin</a:t>
+          <a:lstStyle>
+            <a:lvl1pPr marL="342900" indent="-342900" algn="l" defTabSz="914400" rtl="0" eaLnBrk="1" latinLnBrk="0" hangingPunct="1">
+              <a:spcBef>
+                <a:spcPct val="20000"/>
+              </a:spcBef>
+              <a:buFont typeface="Arial" pitchFamily="34" charset="0"/>
+              <a:buChar char="•"/>
+              <a:defRPr sz="3200" kern="1200">
+                <a:solidFill>
+                  <a:schemeClr val="tx1"/>
+                </a:solidFill>
+                <a:latin typeface="+mn-lt"/>
+                <a:ea typeface="+mn-ea"/>
+                <a:cs typeface="+mn-cs"/>
+              </a:defRPr>
+            </a:lvl1pPr>
+            <a:lvl2pPr marL="742950" indent="-285750" algn="l" defTabSz="914400" rtl="0" eaLnBrk="1" latinLnBrk="0" hangingPunct="1">
+              <a:spcBef>
+                <a:spcPct val="20000"/>
+              </a:spcBef>
+              <a:buFont typeface="Arial" pitchFamily="34" charset="0"/>
+              <a:buChar char="–"/>
+              <a:defRPr sz="2800" kern="1200">
+                <a:solidFill>
+                  <a:schemeClr val="tx1"/>
+                </a:solidFill>
+                <a:latin typeface="+mn-lt"/>
+                <a:ea typeface="+mn-ea"/>
+                <a:cs typeface="+mn-cs"/>
+              </a:defRPr>
+            </a:lvl2pPr>
+            <a:lvl3pPr marL="1143000" indent="-228600" algn="l" defTabSz="914400" rtl="0" eaLnBrk="1" latinLnBrk="0" hangingPunct="1">
+              <a:spcBef>
+                <a:spcPct val="20000"/>
+              </a:spcBef>
+              <a:buFont typeface="Arial" pitchFamily="34" charset="0"/>
+              <a:buChar char="•"/>
+              <a:defRPr sz="2400" kern="1200">
+                <a:solidFill>
+                  <a:schemeClr val="tx1"/>
+                </a:solidFill>
+                <a:latin typeface="+mn-lt"/>
+                <a:ea typeface="+mn-ea"/>
+                <a:cs typeface="+mn-cs"/>
+              </a:defRPr>
+            </a:lvl3pPr>
+            <a:lvl4pPr marL="1600200" indent="-228600" algn="l" defTabSz="914400" rtl="0" eaLnBrk="1" latinLnBrk="0" hangingPunct="1">
+              <a:spcBef>
+                <a:spcPct val="20000"/>
+              </a:spcBef>
+              <a:buFont typeface="Arial" pitchFamily="34" charset="0"/>
+              <a:buChar char="–"/>
+              <a:defRPr sz="2000" kern="1200">
+                <a:solidFill>
+                  <a:schemeClr val="tx1"/>
+                </a:solidFill>
+                <a:latin typeface="+mn-lt"/>
+                <a:ea typeface="+mn-ea"/>
+                <a:cs typeface="+mn-cs"/>
+              </a:defRPr>
+            </a:lvl4pPr>
+            <a:lvl5pPr marL="2057400" indent="-228600" algn="l" defTabSz="914400" rtl="0" eaLnBrk="1" latinLnBrk="0" hangingPunct="1">
+              <a:spcBef>
+                <a:spcPct val="20000"/>
+              </a:spcBef>
+              <a:buFont typeface="Arial" pitchFamily="34" charset="0"/>
+              <a:buChar char="»"/>
+              <a:defRPr sz="2000" kern="1200">
+                <a:solidFill>
+                  <a:schemeClr val="tx1"/>
+                </a:solidFill>
+                <a:latin typeface="+mn-lt"/>
+                <a:ea typeface="+mn-ea"/>
+                <a:cs typeface="+mn-cs"/>
+              </a:defRPr>
+            </a:lvl5pPr>
+            <a:lvl6pPr marL="2514600" indent="-228600" algn="l" defTabSz="914400" rtl="0" eaLnBrk="1" latinLnBrk="0" hangingPunct="1">
+              <a:spcBef>
+                <a:spcPct val="20000"/>
+              </a:spcBef>
+              <a:buFont typeface="Arial" pitchFamily="34" charset="0"/>
+              <a:buChar char="•"/>
+              <a:defRPr sz="2000" kern="1200">
+                <a:solidFill>
+                  <a:schemeClr val="tx1"/>
+                </a:solidFill>
+                <a:latin typeface="+mn-lt"/>
+                <a:ea typeface="+mn-ea"/>
+                <a:cs typeface="+mn-cs"/>
+              </a:defRPr>
+            </a:lvl6pPr>
+            <a:lvl7pPr marL="2971800" indent="-228600" algn="l" defTabSz="914400" rtl="0" eaLnBrk="1" latinLnBrk="0" hangingPunct="1">
+              <a:spcBef>
+                <a:spcPct val="20000"/>
+              </a:spcBef>
+              <a:buFont typeface="Arial" pitchFamily="34" charset="0"/>
+              <a:buChar char="•"/>
+              <a:defRPr sz="2000" kern="1200">
+                <a:solidFill>
+                  <a:schemeClr val="tx1"/>
+                </a:solidFill>
+                <a:latin typeface="+mn-lt"/>
+                <a:ea typeface="+mn-ea"/>
+                <a:cs typeface="+mn-cs"/>
+              </a:defRPr>
+            </a:lvl7pPr>
+            <a:lvl8pPr marL="3429000" indent="-228600" algn="l" defTabSz="914400" rtl="0" eaLnBrk="1" latinLnBrk="0" hangingPunct="1">
+              <a:spcBef>
+                <a:spcPct val="20000"/>
+              </a:spcBef>
+              <a:buFont typeface="Arial" pitchFamily="34" charset="0"/>
+              <a:buChar char="•"/>
+              <a:defRPr sz="2000" kern="1200">
+                <a:solidFill>
+                  <a:schemeClr val="tx1"/>
+                </a:solidFill>
+                <a:latin typeface="+mn-lt"/>
+                <a:ea typeface="+mn-ea"/>
+                <a:cs typeface="+mn-cs"/>
+              </a:defRPr>
+            </a:lvl8pPr>
+            <a:lvl9pPr marL="3886200" indent="-228600" algn="l" defTabSz="914400" rtl="0" eaLnBrk="1" latinLnBrk="0" hangingPunct="1">
+              <a:spcBef>
+                <a:spcPct val="20000"/>
+              </a:spcBef>
+              <a:buFont typeface="Arial" pitchFamily="34" charset="0"/>
+              <a:buChar char="•"/>
+              <a:defRPr sz="2000" kern="1200">
+                <a:solidFill>
+                  <a:schemeClr val="tx1"/>
+                </a:solidFill>
+                <a:latin typeface="+mn-lt"/>
+                <a:ea typeface="+mn-ea"/>
+                <a:cs typeface="+mn-cs"/>
+              </a:defRPr>
+            </a:lvl9pPr>
+          </a:lstStyle>
+          <a:p>
+            <a:r>
+              <a:rPr lang="en-US" dirty="0" smtClean="0"/>
+              <a:t>Many ways to use R functionally</a:t>
+            </a:r>
+          </a:p>
+          <a:p>
+            <a:pPr lvl="1"/>
+            <a:r>
+              <a:rPr lang="en-US" dirty="0" smtClean="0"/>
+              <a:t>Many industries</a:t>
+            </a:r>
+          </a:p>
+          <a:p>
+            <a:pPr lvl="1"/>
+            <a:r>
+              <a:rPr lang="en-US" dirty="0" smtClean="0"/>
+              <a:t>Many types of tasks; graphics, data management, big data, sparse data, text analysis </a:t>
+            </a:r>
+          </a:p>
+          <a:p>
+            <a:endParaRPr lang="en-US" dirty="0" smtClean="0"/>
+          </a:p>
+          <a:p>
+            <a:r>
+              <a:rPr lang="en-US" dirty="0" smtClean="0"/>
+              <a:t>Data scientists may often work in a “project” (a folder of related work)</a:t>
+            </a:r>
+          </a:p>
+          <a:p>
+            <a:r>
+              <a:rPr lang="en-US" dirty="0" smtClean="0"/>
+              <a:t>Packages are like projects, but more general.  They help separate functionality</a:t>
+            </a:r>
+          </a:p>
+          <a:p>
+            <a:r>
+              <a:rPr lang="en-US" dirty="0" smtClean="0"/>
+              <a:t>Packages traditionally live on CRAN</a:t>
+            </a:r>
+          </a:p>
+          <a:p>
+            <a:endParaRPr lang="en-US" dirty="0" smtClean="0"/>
+          </a:p>
+          <a:p>
+            <a:pPr lvl="1"/>
+            <a:endParaRPr lang="en-US" dirty="0"/>
+          </a:p>
+        </p:txBody>
+      </p:sp>
+      <p:sp>
+        <p:nvSpPr>
+          <p:cNvPr id="3" name="Title 1"/>
+          <p:cNvSpPr txBox="1">
+            <a:spLocks/>
+          </p:cNvSpPr>
+          <p:nvPr/>
+        </p:nvSpPr>
+        <p:spPr>
+          <a:xfrm>
+            <a:off x="1394565" y="293688"/>
+            <a:ext cx="6781800" cy="773112"/>
+          </a:xfrm>
+          <a:prstGeom prst="rect">
+            <a:avLst/>
+          </a:prstGeom>
+        </p:spPr>
+        <p:txBody>
+          <a:bodyPr/>
+          <a:lstStyle>
+            <a:lvl1pPr algn="ctr" defTabSz="914400" rtl="0" eaLnBrk="1" latinLnBrk="0" hangingPunct="1">
+              <a:spcBef>
+                <a:spcPct val="0"/>
+              </a:spcBef>
+              <a:buNone/>
+              <a:defRPr sz="4400" kern="1200">
+                <a:solidFill>
+                  <a:schemeClr val="tx1"/>
+                </a:solidFill>
+                <a:latin typeface="+mj-lt"/>
+                <a:ea typeface="+mj-ea"/>
+                <a:cs typeface="+mj-cs"/>
+              </a:defRPr>
+            </a:lvl1pPr>
+          </a:lstStyle>
+          <a:p>
+            <a:r>
+              <a:rPr lang="en-US" dirty="0" smtClean="0"/>
+              <a:t>R Fundamentals</a:t>
             </a:r>
             <a:endParaRPr lang="en-US" dirty="0"/>
           </a:p>
@@ -4496,14 +6657,14 @@
       </p:sp>
       <p:pic>
         <p:nvPicPr>
-          <p:cNvPr id="1026" name="Picture 2" descr="U:\GITHUB\DataScienceForBusiness\images_lec3\rpi.jpg"/>
+          <p:cNvPr id="2050" name="Picture 2"/>
           <p:cNvPicPr>
             <a:picLocks noChangeAspect="1" noChangeArrowheads="1"/>
           </p:cNvPicPr>
           <p:nvPr/>
         </p:nvPicPr>
         <p:blipFill>
-          <a:blip r:embed="rId2" cstate="print">
+          <a:blip r:embed="rId2">
             <a:extLst>
               <a:ext uri="{28A0092B-C50C-407E-A947-70E740481C1C}">
                 <a14:useLocalDpi xmlns:a14="http://schemas.microsoft.com/office/drawing/2010/main" val="0"/>
@@ -4517,159 +6678,134 @@
         </p:blipFill>
         <p:spPr bwMode="auto">
           <a:xfrm>
-            <a:off x="1143000" y="2971800"/>
-            <a:ext cx="4683126" cy="3121714"/>
+            <a:off x="4038600" y="1676400"/>
+            <a:ext cx="5017980" cy="4324350"/>
           </a:xfrm>
           <a:prstGeom prst="rect">
             <a:avLst/>
           </a:prstGeom>
           <a:noFill/>
+          <a:ln w="9525">
+            <a:solidFill>
+              <a:schemeClr val="tx1"/>
+            </a:solidFill>
+            <a:miter lim="800000"/>
+            <a:headEnd/>
+            <a:tailEnd/>
+          </a:ln>
           <a:extLst>
             <a:ext uri="{909E8E84-426E-40DD-AFC4-6F175D3DCCD1}">
               <a14:hiddenFill xmlns:a14="http://schemas.microsoft.com/office/drawing/2010/main">
                 <a:solidFill>
-                  <a:srgbClr val="FFFFFF"/>
+                  <a:schemeClr val="accent1"/>
                 </a:solidFill>
               </a14:hiddenFill>
             </a:ext>
           </a:extLst>
         </p:spPr>
       </p:pic>
-      <p:pic>
-        <p:nvPicPr>
-          <p:cNvPr id="1027" name="Picture 3" descr="U:\GITHUB\DataScienceForBusiness\images_lec3\rpi_with_camera.jpg"/>
-          <p:cNvPicPr>
-            <a:picLocks noChangeAspect="1" noChangeArrowheads="1"/>
-          </p:cNvPicPr>
+      <p:sp>
+        <p:nvSpPr>
+          <p:cNvPr id="5" name="Title 1"/>
+          <p:cNvSpPr txBox="1">
+            <a:spLocks/>
+          </p:cNvSpPr>
           <p:nvPr/>
-        </p:nvPicPr>
-        <p:blipFill>
-          <a:blip r:embed="rId3" cstate="print">
-            <a:extLst>
-              <a:ext uri="{28A0092B-C50C-407E-A947-70E740481C1C}">
-                <a14:useLocalDpi xmlns:a14="http://schemas.microsoft.com/office/drawing/2010/main" val="0"/>
-              </a:ext>
-            </a:extLst>
-          </a:blip>
-          <a:srcRect/>
-          <a:stretch>
-            <a:fillRect/>
-          </a:stretch>
-        </p:blipFill>
-        <p:spPr bwMode="auto">
+        </p:nvSpPr>
+        <p:spPr>
           <a:xfrm>
-            <a:off x="5943600" y="3883714"/>
-            <a:ext cx="2133600" cy="2133600"/>
+            <a:off x="4785465" y="1066800"/>
+            <a:ext cx="3524250" cy="386556"/>
           </a:xfrm>
           <a:prstGeom prst="rect">
             <a:avLst/>
           </a:prstGeom>
-          <a:noFill/>
-          <a:extLst>
-            <a:ext uri="{909E8E84-426E-40DD-AFC4-6F175D3DCCD1}">
-              <a14:hiddenFill xmlns:a14="http://schemas.microsoft.com/office/drawing/2010/main">
+        </p:spPr>
+        <p:txBody>
+          <a:bodyPr/>
+          <a:lstStyle>
+            <a:lvl1pPr algn="ctr" defTabSz="914400" rtl="0" eaLnBrk="1" latinLnBrk="0" hangingPunct="1">
+              <a:spcBef>
+                <a:spcPct val="0"/>
+              </a:spcBef>
+              <a:buNone/>
+              <a:defRPr sz="4400" kern="1200">
                 <a:solidFill>
-                  <a:srgbClr val="FFFFFF"/>
+                  <a:schemeClr val="tx1"/>
                 </a:solidFill>
-              </a14:hiddenFill>
-            </a:ext>
-          </a:extLst>
-        </p:spPr>
-      </p:pic>
-      <p:sp>
-        <p:nvSpPr>
-          <p:cNvPr id="5" name="Rectangular Callout 4"/>
-          <p:cNvSpPr/>
+                <a:latin typeface="+mj-lt"/>
+                <a:ea typeface="+mj-ea"/>
+                <a:cs typeface="+mj-cs"/>
+              </a:defRPr>
+            </a:lvl1pPr>
+          </a:lstStyle>
+          <a:p>
+            <a:r>
+              <a:rPr lang="en-US" sz="2000" dirty="0" smtClean="0"/>
+              <a:t>CRAN</a:t>
+            </a:r>
+          </a:p>
+          <a:p>
+            <a:r>
+              <a:rPr lang="en-US" sz="1400" dirty="0"/>
+              <a:t>(actually http://www.r-project.org</a:t>
+            </a:r>
+            <a:r>
+              <a:rPr lang="en-US" sz="1400" dirty="0" smtClean="0"/>
+              <a:t>/)</a:t>
+            </a:r>
+            <a:endParaRPr lang="en-US" sz="3200" dirty="0"/>
+          </a:p>
+        </p:txBody>
+      </p:sp>
+      <p:sp>
+        <p:nvSpPr>
+          <p:cNvPr id="6" name="Title 1"/>
+          <p:cNvSpPr txBox="1">
+            <a:spLocks/>
+          </p:cNvSpPr>
           <p:nvPr/>
         </p:nvSpPr>
         <p:spPr>
           <a:xfrm>
-            <a:off x="7010400" y="2895600"/>
-            <a:ext cx="1371600" cy="457200"/>
+            <a:off x="4785465" y="6248400"/>
+            <a:ext cx="3524250" cy="386556"/>
           </a:xfrm>
-          <a:prstGeom prst="wedgeRectCallout">
-            <a:avLst>
-              <a:gd name="adj1" fmla="val -30033"/>
-              <a:gd name="adj2" fmla="val 150833"/>
-            </a:avLst>
+          <a:prstGeom prst="rect">
+            <a:avLst/>
           </a:prstGeom>
         </p:spPr>
-        <p:style>
-          <a:lnRef idx="2">
-            <a:schemeClr val="accent6"/>
-          </a:lnRef>
-          <a:fillRef idx="1">
-            <a:schemeClr val="lt1"/>
-          </a:fillRef>
-          <a:effectRef idx="0">
-            <a:schemeClr val="accent6"/>
-          </a:effectRef>
-          <a:fontRef idx="minor">
-            <a:schemeClr val="dk1"/>
-          </a:fontRef>
-        </p:style>
-        <p:txBody>
-          <a:bodyPr rtlCol="0" anchor="ctr"/>
-          <a:lstStyle/>
-          <a:p>
-            <a:pPr algn="ctr"/>
-            <a:r>
-              <a:rPr lang="en-US" dirty="0" smtClean="0"/>
-              <a:t>Camera</a:t>
-            </a:r>
-            <a:endParaRPr lang="en-US" dirty="0"/>
-          </a:p>
-        </p:txBody>
-      </p:sp>
-      <p:sp>
-        <p:nvSpPr>
-          <p:cNvPr id="8" name="Rectangular Callout 7"/>
-          <p:cNvSpPr/>
-          <p:nvPr/>
-        </p:nvSpPr>
-        <p:spPr>
-          <a:xfrm>
-            <a:off x="441960" y="1219200"/>
-            <a:ext cx="1371600" cy="457200"/>
-          </a:xfrm>
-          <a:prstGeom prst="wedgeRectCallout">
-            <a:avLst>
-              <a:gd name="adj1" fmla="val 66633"/>
-              <a:gd name="adj2" fmla="val 544166"/>
-            </a:avLst>
-          </a:prstGeom>
-        </p:spPr>
-        <p:style>
-          <a:lnRef idx="2">
-            <a:schemeClr val="accent6"/>
-          </a:lnRef>
-          <a:fillRef idx="1">
-            <a:schemeClr val="lt1"/>
-          </a:fillRef>
-          <a:effectRef idx="0">
-            <a:schemeClr val="accent6"/>
-          </a:effectRef>
-          <a:fontRef idx="minor">
-            <a:schemeClr val="dk1"/>
-          </a:fontRef>
-        </p:style>
-        <p:txBody>
-          <a:bodyPr rtlCol="0" anchor="ctr"/>
-          <a:lstStyle/>
-          <a:p>
-            <a:pPr algn="ctr"/>
-            <a:r>
-              <a:rPr lang="en-US" dirty="0" smtClean="0"/>
-              <a:t>GPIO Pins</a:t>
-            </a:r>
-            <a:endParaRPr lang="en-US" dirty="0"/>
+        <p:txBody>
+          <a:bodyPr/>
+          <a:lstStyle>
+            <a:lvl1pPr algn="ctr" defTabSz="914400" rtl="0" eaLnBrk="1" latinLnBrk="0" hangingPunct="1">
+              <a:spcBef>
+                <a:spcPct val="0"/>
+              </a:spcBef>
+              <a:buNone/>
+              <a:defRPr sz="4400" kern="1200">
+                <a:solidFill>
+                  <a:schemeClr val="tx1"/>
+                </a:solidFill>
+                <a:latin typeface="+mj-lt"/>
+                <a:ea typeface="+mj-ea"/>
+                <a:cs typeface="+mj-cs"/>
+              </a:defRPr>
+            </a:lvl1pPr>
+          </a:lstStyle>
+          <a:p>
+            <a:r>
+              <a:rPr lang="en-US" sz="2000" dirty="0" smtClean="0"/>
+              <a:t>Unchanged since ???</a:t>
+            </a:r>
+            <a:endParaRPr lang="en-US" sz="3200" dirty="0"/>
           </a:p>
         </p:txBody>
       </p:sp>
     </p:spTree>
     <p:extLst>
       <p:ext uri="{BB962C8B-B14F-4D97-AF65-F5344CB8AC3E}">
-        <p14:creationId xmlns:p14="http://schemas.microsoft.com/office/powerpoint/2010/main" val="4121971022"/>
+        <p14:creationId xmlns:p14="http://schemas.microsoft.com/office/powerpoint/2010/main" val="295845612"/>
       </p:ext>
     </p:extLst>
   </p:cSld>
@@ -4706,7 +6842,12 @@
             <p:ph type="title"/>
           </p:nvPr>
         </p:nvSpPr>
-        <p:spPr/>
+        <p:spPr>
+          <a:xfrm>
+            <a:off x="1905000" y="152400"/>
+            <a:ext cx="6781800" cy="563562"/>
+          </a:xfrm>
+        </p:spPr>
         <p:txBody>
           <a:bodyPr>
             <a:normAutofit fontScale="90000"/>
@@ -4714,51 +6855,1264 @@
           <a:lstStyle/>
           <a:p>
             <a:r>
-              <a:rPr lang="en-US" dirty="0" smtClean="0"/>
-              <a:t>Remote Connections -</a:t>
-            </a:r>
-            <a:br>
-              <a:rPr lang="en-US" dirty="0" smtClean="0"/>
-            </a:br>
-            <a:r>
-              <a:rPr lang="en-US" dirty="0" smtClean="0"/>
-              <a:t>Can also save you!</a:t>
-            </a:r>
+              <a:rPr lang="en-US" sz="3200" dirty="0" smtClean="0"/>
+              <a:t>Packages vs. Projects</a:t>
+            </a:r>
+            <a:endParaRPr lang="en-US" sz="3200" dirty="0"/>
+          </a:p>
+        </p:txBody>
+      </p:sp>
+      <p:sp>
+        <p:nvSpPr>
+          <p:cNvPr id="3" name="Content Placeholder 2"/>
+          <p:cNvSpPr>
+            <a:spLocks noGrp="1"/>
+          </p:cNvSpPr>
+          <p:nvPr>
+            <p:ph idx="1"/>
+          </p:nvPr>
+        </p:nvSpPr>
+        <p:spPr>
+          <a:xfrm>
+            <a:off x="1447800" y="990600"/>
+            <a:ext cx="3657600" cy="5486400"/>
+          </a:xfrm>
+        </p:spPr>
+        <p:txBody>
+          <a:bodyPr>
+            <a:normAutofit fontScale="70000" lnSpcReduction="20000"/>
+          </a:bodyPr>
+          <a:lstStyle/>
+          <a:p>
+            <a:r>
+              <a:rPr lang="en-US" dirty="0" smtClean="0"/>
+              <a:t>Packages generally have</a:t>
+            </a:r>
+          </a:p>
+          <a:p>
+            <a:pPr lvl="1"/>
+            <a:r>
+              <a:rPr lang="en-US" dirty="0" smtClean="0"/>
+              <a:t>Example Data</a:t>
+            </a:r>
+          </a:p>
+          <a:p>
+            <a:pPr lvl="1"/>
+            <a:r>
+              <a:rPr lang="en-US" strike="sngStrike" dirty="0" smtClean="0"/>
+              <a:t>Project Specific Data</a:t>
+            </a:r>
+          </a:p>
+          <a:p>
+            <a:pPr lvl="1"/>
+            <a:r>
+              <a:rPr lang="en-US" strike="sngStrike" dirty="0"/>
+              <a:t>Scripts</a:t>
+            </a:r>
+          </a:p>
+          <a:p>
+            <a:pPr lvl="1"/>
+            <a:r>
+              <a:rPr lang="en-US" dirty="0" smtClean="0"/>
+              <a:t>Functions</a:t>
+            </a:r>
+          </a:p>
+          <a:p>
+            <a:pPr lvl="1"/>
+            <a:r>
+              <a:rPr lang="en-US" dirty="0"/>
+              <a:t>Documentation </a:t>
+            </a:r>
+            <a:endParaRPr lang="en-US" dirty="0" smtClean="0"/>
+          </a:p>
+          <a:p>
+            <a:pPr lvl="1"/>
+            <a:r>
+              <a:rPr lang="en-US" dirty="0" smtClean="0"/>
+              <a:t>Help files</a:t>
+            </a:r>
+          </a:p>
+          <a:p>
+            <a:pPr lvl="1"/>
+            <a:r>
+              <a:rPr lang="en-US" dirty="0" smtClean="0"/>
+              <a:t>Unit tests</a:t>
+            </a:r>
+          </a:p>
+          <a:p>
+            <a:pPr lvl="1"/>
+            <a:r>
+              <a:rPr lang="en-US" dirty="0" smtClean="0"/>
+              <a:t>Additional help</a:t>
+            </a:r>
+          </a:p>
+          <a:p>
+            <a:pPr lvl="1"/>
+            <a:r>
+              <a:rPr lang="en-US" dirty="0" smtClean="0"/>
+              <a:t>Contact info</a:t>
+            </a:r>
+          </a:p>
+          <a:p>
+            <a:r>
+              <a:rPr lang="en-US" dirty="0" smtClean="0"/>
+              <a:t>Packages can be created within R with</a:t>
+            </a:r>
+          </a:p>
+          <a:p>
+            <a:pPr marL="0" indent="0">
+              <a:buNone/>
+            </a:pPr>
+            <a:r>
+              <a:rPr lang="en-US" dirty="0"/>
+              <a:t> </a:t>
+            </a:r>
+            <a:r>
+              <a:rPr lang="en-US" dirty="0" smtClean="0"/>
+              <a:t>     </a:t>
+            </a:r>
+            <a:r>
+              <a:rPr lang="en-US" dirty="0" err="1" smtClean="0"/>
+              <a:t>package.skeleton</a:t>
+            </a:r>
+            <a:r>
+              <a:rPr lang="en-US" dirty="0" smtClean="0"/>
+              <a:t>()</a:t>
+            </a:r>
+          </a:p>
+          <a:p>
+            <a:r>
+              <a:rPr lang="en-US" dirty="0" smtClean="0"/>
+              <a:t>Packages can be compiled with R Studio</a:t>
+            </a:r>
+          </a:p>
+          <a:p>
+            <a:r>
+              <a:rPr lang="en-US" dirty="0" smtClean="0"/>
+              <a:t>Packages are like software</a:t>
+            </a:r>
+          </a:p>
+          <a:p>
+            <a:pPr lvl="1"/>
             <a:endParaRPr lang="en-US" dirty="0"/>
           </a:p>
         </p:txBody>
       </p:sp>
       <p:sp>
         <p:nvSpPr>
-          <p:cNvPr id="3" name="Content Placeholder 2"/>
-          <p:cNvSpPr>
-            <a:spLocks noGrp="1"/>
-          </p:cNvSpPr>
-          <p:nvPr>
-            <p:ph idx="1"/>
-          </p:nvPr>
-        </p:nvSpPr>
-        <p:spPr/>
-        <p:txBody>
-          <a:bodyPr/>
-          <a:lstStyle/>
-          <a:p>
-            <a:r>
-              <a:rPr lang="en-US" smtClean="0"/>
-              <a:t>Open AWS </a:t>
-            </a:r>
-            <a:r>
-              <a:rPr lang="en-US" dirty="0" smtClean="0"/>
-              <a:t>Example</a:t>
-            </a:r>
-            <a:endParaRPr lang="en-US" dirty="0"/>
+          <p:cNvPr id="4" name="Content Placeholder 2"/>
+          <p:cNvSpPr txBox="1">
+            <a:spLocks/>
+          </p:cNvSpPr>
+          <p:nvPr/>
+        </p:nvSpPr>
+        <p:spPr>
+          <a:xfrm>
+            <a:off x="5029200" y="990600"/>
+            <a:ext cx="3657600" cy="5486400"/>
+          </a:xfrm>
+          <a:prstGeom prst="rect">
+            <a:avLst/>
+          </a:prstGeom>
+        </p:spPr>
+        <p:txBody>
+          <a:bodyPr vert="horz" lIns="91440" tIns="45720" rIns="91440" bIns="45720" rtlCol="0">
+            <a:normAutofit fontScale="70000" lnSpcReduction="20000"/>
+          </a:bodyPr>
+          <a:lstStyle>
+            <a:lvl1pPr marL="342900" indent="-342900" algn="l" defTabSz="914400" rtl="0" eaLnBrk="1" latinLnBrk="0" hangingPunct="1">
+              <a:spcBef>
+                <a:spcPct val="20000"/>
+              </a:spcBef>
+              <a:buFont typeface="Arial" pitchFamily="34" charset="0"/>
+              <a:buChar char="•"/>
+              <a:defRPr sz="3200" kern="1200">
+                <a:solidFill>
+                  <a:schemeClr val="tx1"/>
+                </a:solidFill>
+                <a:latin typeface="+mn-lt"/>
+                <a:ea typeface="+mn-ea"/>
+                <a:cs typeface="+mn-cs"/>
+              </a:defRPr>
+            </a:lvl1pPr>
+            <a:lvl2pPr marL="742950" indent="-285750" algn="l" defTabSz="914400" rtl="0" eaLnBrk="1" latinLnBrk="0" hangingPunct="1">
+              <a:spcBef>
+                <a:spcPct val="20000"/>
+              </a:spcBef>
+              <a:buFont typeface="Arial" pitchFamily="34" charset="0"/>
+              <a:buChar char="–"/>
+              <a:defRPr sz="2800" kern="1200">
+                <a:solidFill>
+                  <a:schemeClr val="tx1"/>
+                </a:solidFill>
+                <a:latin typeface="+mn-lt"/>
+                <a:ea typeface="+mn-ea"/>
+                <a:cs typeface="+mn-cs"/>
+              </a:defRPr>
+            </a:lvl2pPr>
+            <a:lvl3pPr marL="1143000" indent="-228600" algn="l" defTabSz="914400" rtl="0" eaLnBrk="1" latinLnBrk="0" hangingPunct="1">
+              <a:spcBef>
+                <a:spcPct val="20000"/>
+              </a:spcBef>
+              <a:buFont typeface="Arial" pitchFamily="34" charset="0"/>
+              <a:buChar char="•"/>
+              <a:defRPr sz="2400" kern="1200">
+                <a:solidFill>
+                  <a:schemeClr val="tx1"/>
+                </a:solidFill>
+                <a:latin typeface="+mn-lt"/>
+                <a:ea typeface="+mn-ea"/>
+                <a:cs typeface="+mn-cs"/>
+              </a:defRPr>
+            </a:lvl3pPr>
+            <a:lvl4pPr marL="1600200" indent="-228600" algn="l" defTabSz="914400" rtl="0" eaLnBrk="1" latinLnBrk="0" hangingPunct="1">
+              <a:spcBef>
+                <a:spcPct val="20000"/>
+              </a:spcBef>
+              <a:buFont typeface="Arial" pitchFamily="34" charset="0"/>
+              <a:buChar char="–"/>
+              <a:defRPr sz="2000" kern="1200">
+                <a:solidFill>
+                  <a:schemeClr val="tx1"/>
+                </a:solidFill>
+                <a:latin typeface="+mn-lt"/>
+                <a:ea typeface="+mn-ea"/>
+                <a:cs typeface="+mn-cs"/>
+              </a:defRPr>
+            </a:lvl4pPr>
+            <a:lvl5pPr marL="2057400" indent="-228600" algn="l" defTabSz="914400" rtl="0" eaLnBrk="1" latinLnBrk="0" hangingPunct="1">
+              <a:spcBef>
+                <a:spcPct val="20000"/>
+              </a:spcBef>
+              <a:buFont typeface="Arial" pitchFamily="34" charset="0"/>
+              <a:buChar char="»"/>
+              <a:defRPr sz="2000" kern="1200">
+                <a:solidFill>
+                  <a:schemeClr val="tx1"/>
+                </a:solidFill>
+                <a:latin typeface="+mn-lt"/>
+                <a:ea typeface="+mn-ea"/>
+                <a:cs typeface="+mn-cs"/>
+              </a:defRPr>
+            </a:lvl5pPr>
+            <a:lvl6pPr marL="2514600" indent="-228600" algn="l" defTabSz="914400" rtl="0" eaLnBrk="1" latinLnBrk="0" hangingPunct="1">
+              <a:spcBef>
+                <a:spcPct val="20000"/>
+              </a:spcBef>
+              <a:buFont typeface="Arial" pitchFamily="34" charset="0"/>
+              <a:buChar char="•"/>
+              <a:defRPr sz="2000" kern="1200">
+                <a:solidFill>
+                  <a:schemeClr val="tx1"/>
+                </a:solidFill>
+                <a:latin typeface="+mn-lt"/>
+                <a:ea typeface="+mn-ea"/>
+                <a:cs typeface="+mn-cs"/>
+              </a:defRPr>
+            </a:lvl6pPr>
+            <a:lvl7pPr marL="2971800" indent="-228600" algn="l" defTabSz="914400" rtl="0" eaLnBrk="1" latinLnBrk="0" hangingPunct="1">
+              <a:spcBef>
+                <a:spcPct val="20000"/>
+              </a:spcBef>
+              <a:buFont typeface="Arial" pitchFamily="34" charset="0"/>
+              <a:buChar char="•"/>
+              <a:defRPr sz="2000" kern="1200">
+                <a:solidFill>
+                  <a:schemeClr val="tx1"/>
+                </a:solidFill>
+                <a:latin typeface="+mn-lt"/>
+                <a:ea typeface="+mn-ea"/>
+                <a:cs typeface="+mn-cs"/>
+              </a:defRPr>
+            </a:lvl7pPr>
+            <a:lvl8pPr marL="3429000" indent="-228600" algn="l" defTabSz="914400" rtl="0" eaLnBrk="1" latinLnBrk="0" hangingPunct="1">
+              <a:spcBef>
+                <a:spcPct val="20000"/>
+              </a:spcBef>
+              <a:buFont typeface="Arial" pitchFamily="34" charset="0"/>
+              <a:buChar char="•"/>
+              <a:defRPr sz="2000" kern="1200">
+                <a:solidFill>
+                  <a:schemeClr val="tx1"/>
+                </a:solidFill>
+                <a:latin typeface="+mn-lt"/>
+                <a:ea typeface="+mn-ea"/>
+                <a:cs typeface="+mn-cs"/>
+              </a:defRPr>
+            </a:lvl8pPr>
+            <a:lvl9pPr marL="3886200" indent="-228600" algn="l" defTabSz="914400" rtl="0" eaLnBrk="1" latinLnBrk="0" hangingPunct="1">
+              <a:spcBef>
+                <a:spcPct val="20000"/>
+              </a:spcBef>
+              <a:buFont typeface="Arial" pitchFamily="34" charset="0"/>
+              <a:buChar char="•"/>
+              <a:defRPr sz="2000" kern="1200">
+                <a:solidFill>
+                  <a:schemeClr val="tx1"/>
+                </a:solidFill>
+                <a:latin typeface="+mn-lt"/>
+                <a:ea typeface="+mn-ea"/>
+                <a:cs typeface="+mn-cs"/>
+              </a:defRPr>
+            </a:lvl9pPr>
+          </a:lstStyle>
+          <a:p>
+            <a:r>
+              <a:rPr lang="en-US" dirty="0" smtClean="0"/>
+              <a:t>Projects generally have</a:t>
+            </a:r>
+          </a:p>
+          <a:p>
+            <a:pPr lvl="1"/>
+            <a:r>
+              <a:rPr lang="en-US" strike="sngStrike" dirty="0" smtClean="0"/>
+              <a:t>Example Data</a:t>
+            </a:r>
+          </a:p>
+          <a:p>
+            <a:pPr lvl="1"/>
+            <a:r>
+              <a:rPr lang="en-US" sz="2900" dirty="0"/>
+              <a:t>Project Specific Data</a:t>
+            </a:r>
+          </a:p>
+          <a:p>
+            <a:pPr lvl="1"/>
+            <a:r>
+              <a:rPr lang="en-US" dirty="0" smtClean="0"/>
+              <a:t>Scripts</a:t>
+            </a:r>
+          </a:p>
+          <a:p>
+            <a:pPr lvl="1"/>
+            <a:r>
+              <a:rPr lang="en-US" dirty="0" smtClean="0"/>
+              <a:t>Functions</a:t>
+            </a:r>
+          </a:p>
+          <a:p>
+            <a:pPr lvl="1"/>
+            <a:r>
+              <a:rPr lang="en-US" dirty="0" smtClean="0"/>
+              <a:t>Documentation </a:t>
+            </a:r>
+          </a:p>
+          <a:p>
+            <a:pPr lvl="1"/>
+            <a:r>
+              <a:rPr lang="en-US" strike="sngStrike" dirty="0" smtClean="0"/>
+              <a:t>Help files</a:t>
+            </a:r>
+          </a:p>
+          <a:p>
+            <a:pPr lvl="1"/>
+            <a:r>
+              <a:rPr lang="en-US" strike="sngStrike" dirty="0" smtClean="0"/>
+              <a:t>Unit tests</a:t>
+            </a:r>
+          </a:p>
+          <a:p>
+            <a:pPr lvl="1"/>
+            <a:r>
+              <a:rPr lang="en-US" strike="sngStrike" dirty="0" smtClean="0"/>
+              <a:t>Additional help</a:t>
+            </a:r>
+          </a:p>
+          <a:p>
+            <a:pPr lvl="1"/>
+            <a:r>
+              <a:rPr lang="en-US" strike="sngStrike" dirty="0" smtClean="0"/>
+              <a:t>Contact info</a:t>
+            </a:r>
+          </a:p>
+          <a:p>
+            <a:r>
+              <a:rPr lang="en-US" dirty="0" smtClean="0"/>
+              <a:t>Projects are just text files in folders on a computer</a:t>
+            </a:r>
+          </a:p>
+          <a:p>
+            <a:r>
+              <a:rPr lang="en-US" dirty="0" smtClean="0"/>
+              <a:t>R Studio projects have an .</a:t>
+            </a:r>
+            <a:r>
+              <a:rPr lang="en-US" dirty="0" err="1" smtClean="0"/>
+              <a:t>Rproj</a:t>
+            </a:r>
+            <a:r>
+              <a:rPr lang="en-US" dirty="0" smtClean="0"/>
+              <a:t> “project” file</a:t>
+            </a:r>
+          </a:p>
+          <a:p>
+            <a:r>
+              <a:rPr lang="en-US" dirty="0" smtClean="0"/>
+              <a:t>Projects are specific to their intended use</a:t>
+            </a:r>
           </a:p>
         </p:txBody>
       </p:sp>
     </p:spTree>
     <p:extLst>
       <p:ext uri="{BB962C8B-B14F-4D97-AF65-F5344CB8AC3E}">
-        <p14:creationId xmlns:p14="http://schemas.microsoft.com/office/powerpoint/2010/main" val="756721134"/>
+        <p14:creationId xmlns:p14="http://schemas.microsoft.com/office/powerpoint/2010/main" val="1328341174"/>
+      </p:ext>
+    </p:extLst>
+  </p:cSld>
+  <p:clrMapOvr>
+    <a:masterClrMapping/>
+  </p:clrMapOvr>
+</p:sld>
+</file>
+
+<file path=ppt/slides/slide7.xml><?xml version="1.0" encoding="utf-8"?>
+<p:sld xmlns:a="http://schemas.openxmlformats.org/drawingml/2006/main" xmlns:r="http://schemas.openxmlformats.org/officeDocument/2006/relationships" xmlns:p="http://schemas.openxmlformats.org/presentationml/2006/main">
+  <p:cSld>
+    <p:spTree>
+      <p:nvGrpSpPr>
+        <p:cNvPr id="1" name=""/>
+        <p:cNvGrpSpPr/>
+        <p:nvPr/>
+      </p:nvGrpSpPr>
+      <p:grpSpPr>
+        <a:xfrm>
+          <a:off x="0" y="0"/>
+          <a:ext cx="0" cy="0"/>
+          <a:chOff x="0" y="0"/>
+          <a:chExt cx="0" cy="0"/>
+        </a:xfrm>
+      </p:grpSpPr>
+      <p:sp>
+        <p:nvSpPr>
+          <p:cNvPr id="2" name="Title 1"/>
+          <p:cNvSpPr>
+            <a:spLocks noGrp="1"/>
+          </p:cNvSpPr>
+          <p:nvPr>
+            <p:ph type="title"/>
+          </p:nvPr>
+        </p:nvSpPr>
+        <p:spPr>
+          <a:xfrm>
+            <a:off x="1889104" y="0"/>
+            <a:ext cx="6781800" cy="563562"/>
+          </a:xfrm>
+        </p:spPr>
+        <p:txBody>
+          <a:bodyPr>
+            <a:normAutofit fontScale="90000"/>
+          </a:bodyPr>
+          <a:lstStyle/>
+          <a:p>
+            <a:r>
+              <a:rPr lang="en-US" dirty="0" smtClean="0"/>
+              <a:t>Notes about packages:</a:t>
+            </a:r>
+            <a:endParaRPr lang="en-US" dirty="0"/>
+          </a:p>
+        </p:txBody>
+      </p:sp>
+      <p:sp>
+        <p:nvSpPr>
+          <p:cNvPr id="3" name="Content Placeholder 2"/>
+          <p:cNvSpPr>
+            <a:spLocks noGrp="1"/>
+          </p:cNvSpPr>
+          <p:nvPr>
+            <p:ph idx="1"/>
+          </p:nvPr>
+        </p:nvSpPr>
+        <p:spPr>
+          <a:xfrm>
+            <a:off x="1524000" y="762000"/>
+            <a:ext cx="7656286" cy="3352800"/>
+          </a:xfrm>
+        </p:spPr>
+        <p:txBody>
+          <a:bodyPr>
+            <a:normAutofit fontScale="55000" lnSpcReduction="20000"/>
+          </a:bodyPr>
+          <a:lstStyle/>
+          <a:p>
+            <a:r>
+              <a:rPr lang="en-US" dirty="0" smtClean="0"/>
+              <a:t>As a user of packages</a:t>
+            </a:r>
+          </a:p>
+          <a:p>
+            <a:pPr lvl="1"/>
+            <a:r>
+              <a:rPr lang="en-US" dirty="0" smtClean="0"/>
+              <a:t>Almost all packages came from CRAN</a:t>
+            </a:r>
+          </a:p>
+          <a:p>
+            <a:pPr lvl="1"/>
+            <a:r>
+              <a:rPr lang="en-US" dirty="0" smtClean="0"/>
+              <a:t>Now you can get them from other places using the </a:t>
+            </a:r>
+            <a:r>
+              <a:rPr lang="en-US" dirty="0" err="1" smtClean="0"/>
+              <a:t>devtools</a:t>
+            </a:r>
+            <a:r>
+              <a:rPr lang="en-US" dirty="0" smtClean="0"/>
+              <a:t> package (available on CRAN!)</a:t>
+            </a:r>
+          </a:p>
+          <a:p>
+            <a:r>
+              <a:rPr lang="en-US" dirty="0" smtClean="0"/>
+              <a:t>CRAN packages are nice to use because they’re very maintained</a:t>
+            </a:r>
+          </a:p>
+          <a:p>
+            <a:pPr lvl="1"/>
+            <a:r>
+              <a:rPr lang="en-US" dirty="0" smtClean="0"/>
+              <a:t>Install with “</a:t>
+            </a:r>
+            <a:r>
+              <a:rPr lang="en-US" dirty="0" err="1" smtClean="0"/>
+              <a:t>install.packages</a:t>
+            </a:r>
+            <a:r>
+              <a:rPr lang="en-US" dirty="0" smtClean="0"/>
+              <a:t>()”, update with “</a:t>
+            </a:r>
+            <a:r>
+              <a:rPr lang="en-US" dirty="0" err="1" smtClean="0"/>
+              <a:t>update.packages</a:t>
+            </a:r>
+            <a:r>
+              <a:rPr lang="en-US" dirty="0" smtClean="0"/>
+              <a:t>()”</a:t>
+            </a:r>
+          </a:p>
+          <a:p>
+            <a:r>
+              <a:rPr lang="en-US" dirty="0" smtClean="0"/>
+              <a:t>CRAN packages are a pain to create!</a:t>
+            </a:r>
+          </a:p>
+          <a:p>
+            <a:pPr lvl="1"/>
+            <a:r>
+              <a:rPr lang="en-US" dirty="0" smtClean="0"/>
+              <a:t>Github has emerged as an </a:t>
+            </a:r>
+            <a:r>
+              <a:rPr lang="en-US" dirty="0" err="1" smtClean="0"/>
+              <a:t>alternitive</a:t>
+            </a:r>
+            <a:r>
+              <a:rPr lang="en-US" dirty="0" smtClean="0"/>
+              <a:t>  (via </a:t>
+            </a:r>
+            <a:r>
+              <a:rPr lang="en-US" dirty="0" err="1" smtClean="0"/>
+              <a:t>devtools</a:t>
+            </a:r>
+            <a:r>
+              <a:rPr lang="en-US" dirty="0" smtClean="0"/>
+              <a:t>) </a:t>
+            </a:r>
+          </a:p>
+          <a:p>
+            <a:endParaRPr lang="en-US" dirty="0" smtClean="0"/>
+          </a:p>
+          <a:p>
+            <a:r>
+              <a:rPr lang="en-US" dirty="0" smtClean="0"/>
+              <a:t>How to develop an R Package</a:t>
+            </a:r>
+          </a:p>
+          <a:p>
+            <a:pPr marL="0" indent="0">
+              <a:buNone/>
+            </a:pPr>
+            <a:r>
+              <a:rPr lang="en-US" dirty="0" smtClean="0"/>
+              <a:t>http</a:t>
+            </a:r>
+            <a:r>
+              <a:rPr lang="en-US" dirty="0"/>
+              <a:t>://stackoverflow.com/questions/7297458/how-to-develop-a-package-in-r</a:t>
+            </a:r>
+          </a:p>
+        </p:txBody>
+      </p:sp>
+      <p:pic>
+        <p:nvPicPr>
+          <p:cNvPr id="3074" name="Picture 2"/>
+          <p:cNvPicPr>
+            <a:picLocks noChangeAspect="1" noChangeArrowheads="1"/>
+          </p:cNvPicPr>
+          <p:nvPr/>
+        </p:nvPicPr>
+        <p:blipFill>
+          <a:blip r:embed="rId2">
+            <a:extLst>
+              <a:ext uri="{28A0092B-C50C-407E-A947-70E740481C1C}">
+                <a14:useLocalDpi xmlns:a14="http://schemas.microsoft.com/office/drawing/2010/main" val="0"/>
+              </a:ext>
+            </a:extLst>
+          </a:blip>
+          <a:srcRect/>
+          <a:stretch>
+            <a:fillRect/>
+          </a:stretch>
+        </p:blipFill>
+        <p:spPr bwMode="auto">
+          <a:xfrm>
+            <a:off x="2130383" y="3657600"/>
+            <a:ext cx="6299242" cy="3084457"/>
+          </a:xfrm>
+          <a:prstGeom prst="rect">
+            <a:avLst/>
+          </a:prstGeom>
+          <a:noFill/>
+          <a:ln>
+            <a:noFill/>
+          </a:ln>
+          <a:extLst>
+            <a:ext uri="{909E8E84-426E-40DD-AFC4-6F175D3DCCD1}">
+              <a14:hiddenFill xmlns:a14="http://schemas.microsoft.com/office/drawing/2010/main">
+                <a:solidFill>
+                  <a:schemeClr val="accent1"/>
+                </a:solidFill>
+              </a14:hiddenFill>
+            </a:ext>
+            <a:ext uri="{91240B29-F687-4F45-9708-019B960494DF}">
+              <a14:hiddenLine xmlns:a14="http://schemas.microsoft.com/office/drawing/2010/main" w="9525">
+                <a:solidFill>
+                  <a:schemeClr val="tx1"/>
+                </a:solidFill>
+                <a:miter lim="800000"/>
+                <a:headEnd/>
+                <a:tailEnd/>
+              </a14:hiddenLine>
+            </a:ext>
+          </a:extLst>
+        </p:spPr>
+      </p:pic>
+    </p:spTree>
+    <p:extLst>
+      <p:ext uri="{BB962C8B-B14F-4D97-AF65-F5344CB8AC3E}">
+        <p14:creationId xmlns:p14="http://schemas.microsoft.com/office/powerpoint/2010/main" val="1627520530"/>
+      </p:ext>
+    </p:extLst>
+  </p:cSld>
+  <p:clrMapOvr>
+    <a:masterClrMapping/>
+  </p:clrMapOvr>
+</p:sld>
+</file>
+
+<file path=ppt/slides/slide8.xml><?xml version="1.0" encoding="utf-8"?>
+<p:sld xmlns:a="http://schemas.openxmlformats.org/drawingml/2006/main" xmlns:r="http://schemas.openxmlformats.org/officeDocument/2006/relationships" xmlns:p="http://schemas.openxmlformats.org/presentationml/2006/main">
+  <p:cSld>
+    <p:spTree>
+      <p:nvGrpSpPr>
+        <p:cNvPr id="1" name=""/>
+        <p:cNvGrpSpPr/>
+        <p:nvPr/>
+      </p:nvGrpSpPr>
+      <p:grpSpPr>
+        <a:xfrm>
+          <a:off x="0" y="0"/>
+          <a:ext cx="0" cy="0"/>
+          <a:chOff x="0" y="0"/>
+          <a:chExt cx="0" cy="0"/>
+        </a:xfrm>
+      </p:grpSpPr>
+      <p:sp>
+        <p:nvSpPr>
+          <p:cNvPr id="2" name="Title 1"/>
+          <p:cNvSpPr>
+            <a:spLocks noGrp="1"/>
+          </p:cNvSpPr>
+          <p:nvPr>
+            <p:ph type="title"/>
+          </p:nvPr>
+        </p:nvSpPr>
+        <p:spPr/>
+        <p:txBody>
+          <a:bodyPr/>
+          <a:lstStyle/>
+          <a:p>
+            <a:r>
+              <a:rPr lang="en-US" dirty="0" smtClean="0"/>
+              <a:t>Components of a Package</a:t>
+            </a:r>
+            <a:endParaRPr lang="en-US" dirty="0"/>
+          </a:p>
+        </p:txBody>
+      </p:sp>
+      <p:sp>
+        <p:nvSpPr>
+          <p:cNvPr id="3" name="Content Placeholder 2"/>
+          <p:cNvSpPr>
+            <a:spLocks noGrp="1"/>
+          </p:cNvSpPr>
+          <p:nvPr>
+            <p:ph idx="1"/>
+          </p:nvPr>
+        </p:nvSpPr>
+        <p:spPr>
+          <a:xfrm>
+            <a:off x="1905000" y="1600201"/>
+            <a:ext cx="6781800" cy="1142999"/>
+          </a:xfrm>
+        </p:spPr>
+        <p:txBody>
+          <a:bodyPr>
+            <a:normAutofit fontScale="62500" lnSpcReduction="20000"/>
+          </a:bodyPr>
+          <a:lstStyle/>
+          <a:p>
+            <a:r>
+              <a:rPr lang="en-US" dirty="0" smtClean="0"/>
+              <a:t>R has a function to generate the bare essentials: </a:t>
+            </a:r>
+            <a:r>
+              <a:rPr lang="en-US" dirty="0" err="1" smtClean="0"/>
+              <a:t>pacakge.skeleton</a:t>
+            </a:r>
+            <a:r>
+              <a:rPr lang="en-US" dirty="0" smtClean="0"/>
+              <a:t>()</a:t>
+            </a:r>
+          </a:p>
+          <a:p>
+            <a:r>
+              <a:rPr lang="en-US" dirty="0" smtClean="0"/>
+              <a:t>Here’s an example of the components for my package:</a:t>
+            </a:r>
+          </a:p>
+        </p:txBody>
+      </p:sp>
+      <p:pic>
+        <p:nvPicPr>
+          <p:cNvPr id="5122" name="Picture 2"/>
+          <p:cNvPicPr>
+            <a:picLocks noChangeAspect="1" noChangeArrowheads="1"/>
+          </p:cNvPicPr>
+          <p:nvPr/>
+        </p:nvPicPr>
+        <p:blipFill>
+          <a:blip r:embed="rId2">
+            <a:extLst>
+              <a:ext uri="{28A0092B-C50C-407E-A947-70E740481C1C}">
+                <a14:useLocalDpi xmlns:a14="http://schemas.microsoft.com/office/drawing/2010/main" val="0"/>
+              </a:ext>
+            </a:extLst>
+          </a:blip>
+          <a:srcRect/>
+          <a:stretch>
+            <a:fillRect/>
+          </a:stretch>
+        </p:blipFill>
+        <p:spPr bwMode="auto">
+          <a:xfrm>
+            <a:off x="3505200" y="2819400"/>
+            <a:ext cx="5381625" cy="3657600"/>
+          </a:xfrm>
+          <a:prstGeom prst="rect">
+            <a:avLst/>
+          </a:prstGeom>
+          <a:noFill/>
+          <a:ln>
+            <a:noFill/>
+          </a:ln>
+          <a:extLst>
+            <a:ext uri="{909E8E84-426E-40DD-AFC4-6F175D3DCCD1}">
+              <a14:hiddenFill xmlns:a14="http://schemas.microsoft.com/office/drawing/2010/main">
+                <a:solidFill>
+                  <a:schemeClr val="accent1"/>
+                </a:solidFill>
+              </a14:hiddenFill>
+            </a:ext>
+            <a:ext uri="{91240B29-F687-4F45-9708-019B960494DF}">
+              <a14:hiddenLine xmlns:a14="http://schemas.microsoft.com/office/drawing/2010/main" w="9525">
+                <a:solidFill>
+                  <a:schemeClr val="tx1"/>
+                </a:solidFill>
+                <a:miter lim="800000"/>
+                <a:headEnd/>
+                <a:tailEnd/>
+              </a14:hiddenLine>
+            </a:ext>
+          </a:extLst>
+        </p:spPr>
+      </p:pic>
+      <p:sp>
+        <p:nvSpPr>
+          <p:cNvPr id="4" name="Rectangular Callout 3"/>
+          <p:cNvSpPr/>
+          <p:nvPr/>
+        </p:nvSpPr>
+        <p:spPr>
+          <a:xfrm>
+            <a:off x="457200" y="2590800"/>
+            <a:ext cx="1676400" cy="990600"/>
+          </a:xfrm>
+          <a:prstGeom prst="wedgeRectCallout">
+            <a:avLst>
+              <a:gd name="adj1" fmla="val 143669"/>
+              <a:gd name="adj2" fmla="val 107922"/>
+            </a:avLst>
+          </a:prstGeom>
+          <a:solidFill>
+            <a:schemeClr val="bg2"/>
+          </a:solidFill>
+          <a:ln>
+            <a:solidFill>
+              <a:srgbClr val="00B0F0"/>
+            </a:solidFill>
+          </a:ln>
+        </p:spPr>
+        <p:style>
+          <a:lnRef idx="2">
+            <a:schemeClr val="accent1">
+              <a:shade val="50000"/>
+            </a:schemeClr>
+          </a:lnRef>
+          <a:fillRef idx="1">
+            <a:schemeClr val="accent1"/>
+          </a:fillRef>
+          <a:effectRef idx="0">
+            <a:schemeClr val="accent1"/>
+          </a:effectRef>
+          <a:fontRef idx="minor">
+            <a:schemeClr val="lt1"/>
+          </a:fontRef>
+        </p:style>
+        <p:txBody>
+          <a:bodyPr rtlCol="0" anchor="ctr"/>
+          <a:lstStyle/>
+          <a:p>
+            <a:pPr algn="ctr"/>
+            <a:r>
+              <a:rPr lang="en-US" dirty="0" smtClean="0">
+                <a:solidFill>
+                  <a:schemeClr val="tx1"/>
+                </a:solidFill>
+              </a:rPr>
+              <a:t>Git and R studio files</a:t>
+            </a:r>
+            <a:endParaRPr lang="en-US" dirty="0">
+              <a:solidFill>
+                <a:schemeClr val="tx1"/>
+              </a:solidFill>
+            </a:endParaRPr>
+          </a:p>
+        </p:txBody>
+      </p:sp>
+      <p:sp>
+        <p:nvSpPr>
+          <p:cNvPr id="6" name="Rectangular Callout 5"/>
+          <p:cNvSpPr/>
+          <p:nvPr/>
+        </p:nvSpPr>
+        <p:spPr>
+          <a:xfrm>
+            <a:off x="152400" y="3733800"/>
+            <a:ext cx="1981200" cy="762000"/>
+          </a:xfrm>
+          <a:prstGeom prst="wedgeRectCallout">
+            <a:avLst>
+              <a:gd name="adj1" fmla="val 123755"/>
+              <a:gd name="adj2" fmla="val 64405"/>
+            </a:avLst>
+          </a:prstGeom>
+          <a:solidFill>
+            <a:schemeClr val="bg2"/>
+          </a:solidFill>
+          <a:ln>
+            <a:solidFill>
+              <a:srgbClr val="00B0F0"/>
+            </a:solidFill>
+          </a:ln>
+        </p:spPr>
+        <p:style>
+          <a:lnRef idx="2">
+            <a:schemeClr val="accent1">
+              <a:shade val="50000"/>
+            </a:schemeClr>
+          </a:lnRef>
+          <a:fillRef idx="1">
+            <a:schemeClr val="accent1"/>
+          </a:fillRef>
+          <a:effectRef idx="0">
+            <a:schemeClr val="accent1"/>
+          </a:effectRef>
+          <a:fontRef idx="minor">
+            <a:schemeClr val="lt1"/>
+          </a:fontRef>
+        </p:style>
+        <p:txBody>
+          <a:bodyPr rtlCol="0" anchor="ctr"/>
+          <a:lstStyle/>
+          <a:p>
+            <a:pPr algn="ctr"/>
+            <a:r>
+              <a:rPr lang="en-US" dirty="0" smtClean="0">
+                <a:solidFill>
+                  <a:schemeClr val="tx1"/>
+                </a:solidFill>
+              </a:rPr>
+              <a:t>DESCRIPTION  and NAMESPACE files are required</a:t>
+            </a:r>
+            <a:endParaRPr lang="en-US" dirty="0">
+              <a:solidFill>
+                <a:schemeClr val="tx1"/>
+              </a:solidFill>
+            </a:endParaRPr>
+          </a:p>
+        </p:txBody>
+      </p:sp>
+      <p:sp>
+        <p:nvSpPr>
+          <p:cNvPr id="7" name="Rectangular Callout 6"/>
+          <p:cNvSpPr/>
+          <p:nvPr/>
+        </p:nvSpPr>
+        <p:spPr>
+          <a:xfrm>
+            <a:off x="304800" y="4593771"/>
+            <a:ext cx="1981200" cy="950686"/>
+          </a:xfrm>
+          <a:prstGeom prst="wedgeRectCallout">
+            <a:avLst>
+              <a:gd name="adj1" fmla="val 114231"/>
+              <a:gd name="adj2" fmla="val 67459"/>
+            </a:avLst>
+          </a:prstGeom>
+          <a:solidFill>
+            <a:schemeClr val="bg2"/>
+          </a:solidFill>
+          <a:ln>
+            <a:solidFill>
+              <a:srgbClr val="00B0F0"/>
+            </a:solidFill>
+          </a:ln>
+        </p:spPr>
+        <p:style>
+          <a:lnRef idx="2">
+            <a:schemeClr val="accent1">
+              <a:shade val="50000"/>
+            </a:schemeClr>
+          </a:lnRef>
+          <a:fillRef idx="1">
+            <a:schemeClr val="accent1"/>
+          </a:fillRef>
+          <a:effectRef idx="0">
+            <a:schemeClr val="accent1"/>
+          </a:effectRef>
+          <a:fontRef idx="minor">
+            <a:schemeClr val="lt1"/>
+          </a:fontRef>
+        </p:style>
+        <p:txBody>
+          <a:bodyPr rtlCol="0" anchor="ctr"/>
+          <a:lstStyle/>
+          <a:p>
+            <a:pPr algn="ctr"/>
+            <a:r>
+              <a:rPr lang="en-US" dirty="0" smtClean="0">
+                <a:solidFill>
+                  <a:schemeClr val="tx1"/>
+                </a:solidFill>
+              </a:rPr>
+              <a:t>Every function is in a separate file in the R folder</a:t>
+            </a:r>
+            <a:endParaRPr lang="en-US" dirty="0">
+              <a:solidFill>
+                <a:schemeClr val="tx1"/>
+              </a:solidFill>
+            </a:endParaRPr>
+          </a:p>
+        </p:txBody>
+      </p:sp>
+      <p:sp>
+        <p:nvSpPr>
+          <p:cNvPr id="8" name="Rectangular Callout 7"/>
+          <p:cNvSpPr/>
+          <p:nvPr/>
+        </p:nvSpPr>
+        <p:spPr>
+          <a:xfrm>
+            <a:off x="152400" y="5667828"/>
+            <a:ext cx="1981200" cy="950686"/>
+          </a:xfrm>
+          <a:prstGeom prst="wedgeRectCallout">
+            <a:avLst>
+              <a:gd name="adj1" fmla="val 122290"/>
+              <a:gd name="adj2" fmla="val -10404"/>
+            </a:avLst>
+          </a:prstGeom>
+          <a:solidFill>
+            <a:schemeClr val="bg2"/>
+          </a:solidFill>
+          <a:ln>
+            <a:solidFill>
+              <a:srgbClr val="00B0F0"/>
+            </a:solidFill>
+          </a:ln>
+        </p:spPr>
+        <p:style>
+          <a:lnRef idx="2">
+            <a:schemeClr val="accent1">
+              <a:shade val="50000"/>
+            </a:schemeClr>
+          </a:lnRef>
+          <a:fillRef idx="1">
+            <a:schemeClr val="accent1"/>
+          </a:fillRef>
+          <a:effectRef idx="0">
+            <a:schemeClr val="accent1"/>
+          </a:effectRef>
+          <a:fontRef idx="minor">
+            <a:schemeClr val="lt1"/>
+          </a:fontRef>
+        </p:style>
+        <p:txBody>
+          <a:bodyPr rtlCol="0" anchor="ctr"/>
+          <a:lstStyle/>
+          <a:p>
+            <a:pPr algn="ctr"/>
+            <a:r>
+              <a:rPr lang="en-US" dirty="0" smtClean="0">
+                <a:solidFill>
+                  <a:schemeClr val="tx1"/>
+                </a:solidFill>
+              </a:rPr>
+              <a:t>This README is for </a:t>
+            </a:r>
+            <a:r>
+              <a:rPr lang="en-US" dirty="0" err="1" smtClean="0">
+                <a:solidFill>
+                  <a:schemeClr val="tx1"/>
+                </a:solidFill>
+              </a:rPr>
+              <a:t>github</a:t>
+            </a:r>
+            <a:r>
+              <a:rPr lang="en-US" dirty="0" smtClean="0">
+                <a:solidFill>
+                  <a:schemeClr val="tx1"/>
+                </a:solidFill>
+              </a:rPr>
+              <a:t>, not CRAN</a:t>
+            </a:r>
+            <a:endParaRPr lang="en-US" dirty="0">
+              <a:solidFill>
+                <a:schemeClr val="tx1"/>
+              </a:solidFill>
+            </a:endParaRPr>
+          </a:p>
+        </p:txBody>
+      </p:sp>
+    </p:spTree>
+    <p:extLst>
+      <p:ext uri="{BB962C8B-B14F-4D97-AF65-F5344CB8AC3E}">
+        <p14:creationId xmlns:p14="http://schemas.microsoft.com/office/powerpoint/2010/main" val="915367230"/>
+      </p:ext>
+    </p:extLst>
+  </p:cSld>
+  <p:clrMapOvr>
+    <a:masterClrMapping/>
+  </p:clrMapOvr>
+</p:sld>
+</file>
+
+<file path=ppt/slides/slide9.xml><?xml version="1.0" encoding="utf-8"?>
+<p:sld xmlns:a="http://schemas.openxmlformats.org/drawingml/2006/main" xmlns:r="http://schemas.openxmlformats.org/officeDocument/2006/relationships" xmlns:p="http://schemas.openxmlformats.org/presentationml/2006/main">
+  <p:cSld>
+    <p:spTree>
+      <p:nvGrpSpPr>
+        <p:cNvPr id="1" name=""/>
+        <p:cNvGrpSpPr/>
+        <p:nvPr/>
+      </p:nvGrpSpPr>
+      <p:grpSpPr>
+        <a:xfrm>
+          <a:off x="0" y="0"/>
+          <a:ext cx="0" cy="0"/>
+          <a:chOff x="0" y="0"/>
+          <a:chExt cx="0" cy="0"/>
+        </a:xfrm>
+      </p:grpSpPr>
+      <p:sp>
+        <p:nvSpPr>
+          <p:cNvPr id="2" name="Title 1"/>
+          <p:cNvSpPr>
+            <a:spLocks noGrp="1"/>
+          </p:cNvSpPr>
+          <p:nvPr>
+            <p:ph type="title"/>
+          </p:nvPr>
+        </p:nvSpPr>
+        <p:spPr>
+          <a:xfrm>
+            <a:off x="1905000" y="274638"/>
+            <a:ext cx="6781800" cy="639762"/>
+          </a:xfrm>
+        </p:spPr>
+        <p:txBody>
+          <a:bodyPr>
+            <a:normAutofit fontScale="90000"/>
+          </a:bodyPr>
+          <a:lstStyle/>
+          <a:p>
+            <a:r>
+              <a:rPr lang="en-US" dirty="0" smtClean="0"/>
+              <a:t>Package Documentation</a:t>
+            </a:r>
+            <a:endParaRPr lang="en-US" dirty="0"/>
+          </a:p>
+        </p:txBody>
+      </p:sp>
+      <p:sp>
+        <p:nvSpPr>
+          <p:cNvPr id="3" name="Content Placeholder 2"/>
+          <p:cNvSpPr>
+            <a:spLocks noGrp="1"/>
+          </p:cNvSpPr>
+          <p:nvPr>
+            <p:ph idx="1"/>
+          </p:nvPr>
+        </p:nvSpPr>
+        <p:spPr>
+          <a:xfrm>
+            <a:off x="1447800" y="1371600"/>
+            <a:ext cx="7315200" cy="4953000"/>
+          </a:xfrm>
+        </p:spPr>
+        <p:txBody>
+          <a:bodyPr>
+            <a:normAutofit lnSpcReduction="10000"/>
+          </a:bodyPr>
+          <a:lstStyle/>
+          <a:p>
+            <a:r>
+              <a:rPr lang="en-US" dirty="0" smtClean="0"/>
+              <a:t>You </a:t>
+            </a:r>
+            <a:r>
+              <a:rPr lang="en-US" i="1" dirty="0" smtClean="0"/>
+              <a:t>will</a:t>
+            </a:r>
+            <a:r>
+              <a:rPr lang="en-US" dirty="0" smtClean="0"/>
+              <a:t> want documentation!</a:t>
+            </a:r>
+          </a:p>
+          <a:p>
+            <a:pPr lvl="1"/>
+            <a:r>
+              <a:rPr lang="en-US" dirty="0" smtClean="0"/>
+              <a:t>Within a package you can make help files using </a:t>
+            </a:r>
+            <a:r>
+              <a:rPr lang="en-US" dirty="0" err="1" smtClean="0"/>
+              <a:t>LaTex</a:t>
+            </a:r>
+            <a:r>
+              <a:rPr lang="en-US" dirty="0" smtClean="0"/>
+              <a:t> (this is the hard way)</a:t>
+            </a:r>
+            <a:endParaRPr lang="en-US" dirty="0"/>
+          </a:p>
+          <a:p>
+            <a:pPr lvl="1"/>
+            <a:r>
+              <a:rPr lang="en-US" dirty="0" smtClean="0"/>
+              <a:t>You can also make documentation using R Oxygen (next slide)</a:t>
+            </a:r>
+          </a:p>
+          <a:p>
+            <a:r>
+              <a:rPr lang="en-US" sz="1800" dirty="0" smtClean="0"/>
+              <a:t>Note: Other types of documentation include reports, readme files, comments… This slide is only about </a:t>
+            </a:r>
+            <a:r>
+              <a:rPr lang="en-US" sz="1800" i="1" dirty="0" smtClean="0"/>
+              <a:t>formal package documentation for functions</a:t>
+            </a:r>
+          </a:p>
+          <a:p>
+            <a:endParaRPr lang="en-US" dirty="0"/>
+          </a:p>
+          <a:p>
+            <a:r>
+              <a:rPr lang="en-US" sz="2400" dirty="0" smtClean="0"/>
+              <a:t>More info</a:t>
+            </a:r>
+          </a:p>
+          <a:p>
+            <a:pPr marL="457200" lvl="1" indent="0">
+              <a:buNone/>
+            </a:pPr>
+            <a:r>
+              <a:rPr lang="en-US" sz="1300" dirty="0">
+                <a:hlinkClick r:id="rId2"/>
+              </a:rPr>
+              <a:t>http://</a:t>
+            </a:r>
+            <a:r>
+              <a:rPr lang="en-US" sz="1300" dirty="0" smtClean="0">
+                <a:hlinkClick r:id="rId2"/>
+              </a:rPr>
+              <a:t>cran.r-project.org/web/packages/roxygen2/vignettes/roxygen2.html</a:t>
+            </a:r>
+            <a:endParaRPr lang="en-US" sz="1300" dirty="0" smtClean="0"/>
+          </a:p>
+          <a:p>
+            <a:pPr marL="457200" lvl="1" indent="0">
+              <a:buNone/>
+            </a:pPr>
+            <a:r>
+              <a:rPr lang="en-US" sz="1300" dirty="0">
+                <a:hlinkClick r:id="rId3"/>
+              </a:rPr>
+              <a:t>https://</a:t>
+            </a:r>
+            <a:r>
+              <a:rPr lang="en-US" sz="1300" dirty="0" smtClean="0">
+                <a:hlinkClick r:id="rId3"/>
+              </a:rPr>
+              <a:t>support.rstudio.com/hc/en-us/articles/200532317-Writing-Package-Documentation</a:t>
+            </a:r>
+            <a:endParaRPr lang="en-US" sz="1300" dirty="0" smtClean="0"/>
+          </a:p>
+          <a:p>
+            <a:pPr marL="457200" lvl="1" indent="0">
+              <a:buNone/>
+            </a:pPr>
+            <a:r>
+              <a:rPr lang="en-US" sz="1300" dirty="0">
+                <a:hlinkClick r:id="rId4"/>
+              </a:rPr>
+              <a:t>http://roxygen.org</a:t>
+            </a:r>
+            <a:r>
+              <a:rPr lang="en-US" sz="1300" dirty="0" smtClean="0">
+                <a:hlinkClick r:id="rId4"/>
+              </a:rPr>
+              <a:t>/</a:t>
+            </a:r>
+            <a:endParaRPr lang="en-US" sz="1300" dirty="0"/>
+          </a:p>
+        </p:txBody>
+      </p:sp>
+    </p:spTree>
+    <p:extLst>
+      <p:ext uri="{BB962C8B-B14F-4D97-AF65-F5344CB8AC3E}">
+        <p14:creationId xmlns:p14="http://schemas.microsoft.com/office/powerpoint/2010/main" val="1854526093"/>
       </p:ext>
     </p:extLst>
   </p:cSld>

</xml_diff>